<commit_message>
Update temp.pptx, about HAL
</commit_message>
<xml_diff>
--- a/temp.pptx
+++ b/temp.pptx
@@ -4,6 +4,9 @@
   <p:sldMasterIdLst>
     <p:sldMasterId id="2147483648" r:id="rId1"/>
   </p:sldMasterIdLst>
+  <p:sldIdLst>
+    <p:sldId id="256" r:id="rId2"/>
+  </p:sldIdLst>
   <p:sldSz cx="12192000" cy="6858000"/>
   <p:notesSz cx="6858000" cy="9144000"/>
   <p:defaultTextStyle>
@@ -101,6 +104,22 @@
       </a:defRPr>
     </a:lvl9pPr>
   </p:defaultTextStyle>
+  <p:extLst>
+    <p:ext uri="{EFAFB233-063F-42B5-8137-9DF3F51BA10A}">
+      <p15:sldGuideLst xmlns:p15="http://schemas.microsoft.com/office/powerpoint/2012/main">
+        <p15:guide id="1" orient="horz" pos="2160">
+          <p15:clr>
+            <a:srgbClr val="A4A3A4"/>
+          </p15:clr>
+        </p15:guide>
+        <p15:guide id="2" pos="3840">
+          <p15:clr>
+            <a:srgbClr val="A4A3A4"/>
+          </p15:clr>
+        </p15:guide>
+      </p15:sldGuideLst>
+    </p:ext>
+  </p:extLst>
 </p:presentation>
 </file>
 
@@ -130,7 +149,7 @@
           <p:cNvPr id="2" name="Title 1">
             <a:extLst>
               <a:ext uri="{FF2B5EF4-FFF2-40B4-BE49-F238E27FC236}">
-                <a16:creationId xmlns:a16="http://schemas.microsoft.com/office/drawing/2014/main" xmlns="" id="{B5F5F319-D979-4A3F-A4F8-4DDCDE891BFD}"/>
+                <a16:creationId xmlns="" xmlns:a16="http://schemas.microsoft.com/office/drawing/2014/main" id="{B5F5F319-D979-4A3F-A4F8-4DDCDE891BFD}"/>
               </a:ext>
             </a:extLst>
           </p:cNvPr>
@@ -167,7 +186,7 @@
           <p:cNvPr id="3" name="Subtitle 2">
             <a:extLst>
               <a:ext uri="{FF2B5EF4-FFF2-40B4-BE49-F238E27FC236}">
-                <a16:creationId xmlns:a16="http://schemas.microsoft.com/office/drawing/2014/main" xmlns="" id="{4474209B-F46B-471F-B216-60C5F4296C14}"/>
+                <a16:creationId xmlns="" xmlns:a16="http://schemas.microsoft.com/office/drawing/2014/main" id="{4474209B-F46B-471F-B216-60C5F4296C14}"/>
               </a:ext>
             </a:extLst>
           </p:cNvPr>
@@ -237,7 +256,7 @@
           <p:cNvPr id="4" name="Date Placeholder 3">
             <a:extLst>
               <a:ext uri="{FF2B5EF4-FFF2-40B4-BE49-F238E27FC236}">
-                <a16:creationId xmlns:a16="http://schemas.microsoft.com/office/drawing/2014/main" xmlns="" id="{1E6B3389-407A-410F-8F6D-D24D84CA4D6B}"/>
+                <a16:creationId xmlns="" xmlns:a16="http://schemas.microsoft.com/office/drawing/2014/main" id="{1E6B3389-407A-410F-8F6D-D24D84CA4D6B}"/>
               </a:ext>
             </a:extLst>
           </p:cNvPr>
@@ -255,7 +274,7 @@
           <a:p>
             <a:fld id="{E040DD28-DA01-4164-BF9D-AEC6AAD07A3E}" type="datetimeFigureOut">
               <a:rPr lang="en-US" smtClean="0"/>
-              <a:t>12/25/2017</a:t>
+              <a:t>1/5/18</a:t>
             </a:fld>
             <a:endParaRPr lang="en-US"/>
           </a:p>
@@ -266,7 +285,7 @@
           <p:cNvPr id="5" name="Footer Placeholder 4">
             <a:extLst>
               <a:ext uri="{FF2B5EF4-FFF2-40B4-BE49-F238E27FC236}">
-                <a16:creationId xmlns:a16="http://schemas.microsoft.com/office/drawing/2014/main" xmlns="" id="{5D8C0812-771C-43AD-B38F-6BC2255600F9}"/>
+                <a16:creationId xmlns="" xmlns:a16="http://schemas.microsoft.com/office/drawing/2014/main" id="{5D8C0812-771C-43AD-B38F-6BC2255600F9}"/>
               </a:ext>
             </a:extLst>
           </p:cNvPr>
@@ -291,7 +310,7 @@
           <p:cNvPr id="6" name="Slide Number Placeholder 5">
             <a:extLst>
               <a:ext uri="{FF2B5EF4-FFF2-40B4-BE49-F238E27FC236}">
-                <a16:creationId xmlns:a16="http://schemas.microsoft.com/office/drawing/2014/main" xmlns="" id="{F39CB706-EA94-418D-9F2C-336E6EF264EC}"/>
+                <a16:creationId xmlns="" xmlns:a16="http://schemas.microsoft.com/office/drawing/2014/main" id="{F39CB706-EA94-418D-9F2C-336E6EF264EC}"/>
               </a:ext>
             </a:extLst>
           </p:cNvPr>
@@ -350,7 +369,7 @@
           <p:cNvPr id="2" name="Title 1">
             <a:extLst>
               <a:ext uri="{FF2B5EF4-FFF2-40B4-BE49-F238E27FC236}">
-                <a16:creationId xmlns:a16="http://schemas.microsoft.com/office/drawing/2014/main" xmlns="" id="{3A259477-0A53-4114-95B2-8A1D5D83E0A2}"/>
+                <a16:creationId xmlns="" xmlns:a16="http://schemas.microsoft.com/office/drawing/2014/main" id="{3A259477-0A53-4114-95B2-8A1D5D83E0A2}"/>
               </a:ext>
             </a:extLst>
           </p:cNvPr>
@@ -378,7 +397,7 @@
           <p:cNvPr id="3" name="Vertical Text Placeholder 2">
             <a:extLst>
               <a:ext uri="{FF2B5EF4-FFF2-40B4-BE49-F238E27FC236}">
-                <a16:creationId xmlns:a16="http://schemas.microsoft.com/office/drawing/2014/main" xmlns="" id="{533E45B0-73AC-4661-B286-CC8B49D0CBB1}"/>
+                <a16:creationId xmlns="" xmlns:a16="http://schemas.microsoft.com/office/drawing/2014/main" id="{533E45B0-73AC-4661-B286-CC8B49D0CBB1}"/>
               </a:ext>
             </a:extLst>
           </p:cNvPr>
@@ -435,7 +454,7 @@
           <p:cNvPr id="4" name="Date Placeholder 3">
             <a:extLst>
               <a:ext uri="{FF2B5EF4-FFF2-40B4-BE49-F238E27FC236}">
-                <a16:creationId xmlns:a16="http://schemas.microsoft.com/office/drawing/2014/main" xmlns="" id="{DDFFC868-093D-4D95-AA93-2203C226F89B}"/>
+                <a16:creationId xmlns="" xmlns:a16="http://schemas.microsoft.com/office/drawing/2014/main" id="{DDFFC868-093D-4D95-AA93-2203C226F89B}"/>
               </a:ext>
             </a:extLst>
           </p:cNvPr>
@@ -453,7 +472,7 @@
           <a:p>
             <a:fld id="{E040DD28-DA01-4164-BF9D-AEC6AAD07A3E}" type="datetimeFigureOut">
               <a:rPr lang="en-US" smtClean="0"/>
-              <a:t>12/25/2017</a:t>
+              <a:t>1/5/18</a:t>
             </a:fld>
             <a:endParaRPr lang="en-US"/>
           </a:p>
@@ -464,7 +483,7 @@
           <p:cNvPr id="5" name="Footer Placeholder 4">
             <a:extLst>
               <a:ext uri="{FF2B5EF4-FFF2-40B4-BE49-F238E27FC236}">
-                <a16:creationId xmlns:a16="http://schemas.microsoft.com/office/drawing/2014/main" xmlns="" id="{CA068C37-6A3A-44A8-A7BE-58942241414E}"/>
+                <a16:creationId xmlns="" xmlns:a16="http://schemas.microsoft.com/office/drawing/2014/main" id="{CA068C37-6A3A-44A8-A7BE-58942241414E}"/>
               </a:ext>
             </a:extLst>
           </p:cNvPr>
@@ -489,7 +508,7 @@
           <p:cNvPr id="6" name="Slide Number Placeholder 5">
             <a:extLst>
               <a:ext uri="{FF2B5EF4-FFF2-40B4-BE49-F238E27FC236}">
-                <a16:creationId xmlns:a16="http://schemas.microsoft.com/office/drawing/2014/main" xmlns="" id="{E78B41CD-FF00-4C28-A410-5C2081075C8F}"/>
+                <a16:creationId xmlns="" xmlns:a16="http://schemas.microsoft.com/office/drawing/2014/main" id="{E78B41CD-FF00-4C28-A410-5C2081075C8F}"/>
               </a:ext>
             </a:extLst>
           </p:cNvPr>
@@ -548,7 +567,7 @@
           <p:cNvPr id="2" name="Vertical Title 1">
             <a:extLst>
               <a:ext uri="{FF2B5EF4-FFF2-40B4-BE49-F238E27FC236}">
-                <a16:creationId xmlns:a16="http://schemas.microsoft.com/office/drawing/2014/main" xmlns="" id="{09D8892F-E415-4A5B-8DE4-93BDA5F0BB5E}"/>
+                <a16:creationId xmlns="" xmlns:a16="http://schemas.microsoft.com/office/drawing/2014/main" id="{09D8892F-E415-4A5B-8DE4-93BDA5F0BB5E}"/>
               </a:ext>
             </a:extLst>
           </p:cNvPr>
@@ -581,7 +600,7 @@
           <p:cNvPr id="3" name="Vertical Text Placeholder 2">
             <a:extLst>
               <a:ext uri="{FF2B5EF4-FFF2-40B4-BE49-F238E27FC236}">
-                <a16:creationId xmlns:a16="http://schemas.microsoft.com/office/drawing/2014/main" xmlns="" id="{D914CE1D-36B4-41F6-8CAC-A824748DF349}"/>
+                <a16:creationId xmlns="" xmlns:a16="http://schemas.microsoft.com/office/drawing/2014/main" id="{D914CE1D-36B4-41F6-8CAC-A824748DF349}"/>
               </a:ext>
             </a:extLst>
           </p:cNvPr>
@@ -643,7 +662,7 @@
           <p:cNvPr id="4" name="Date Placeholder 3">
             <a:extLst>
               <a:ext uri="{FF2B5EF4-FFF2-40B4-BE49-F238E27FC236}">
-                <a16:creationId xmlns:a16="http://schemas.microsoft.com/office/drawing/2014/main" xmlns="" id="{09EBC416-5C2B-4705-88C6-697C7026E134}"/>
+                <a16:creationId xmlns="" xmlns:a16="http://schemas.microsoft.com/office/drawing/2014/main" id="{09EBC416-5C2B-4705-88C6-697C7026E134}"/>
               </a:ext>
             </a:extLst>
           </p:cNvPr>
@@ -661,7 +680,7 @@
           <a:p>
             <a:fld id="{E040DD28-DA01-4164-BF9D-AEC6AAD07A3E}" type="datetimeFigureOut">
               <a:rPr lang="en-US" smtClean="0"/>
-              <a:t>12/25/2017</a:t>
+              <a:t>1/5/18</a:t>
             </a:fld>
             <a:endParaRPr lang="en-US"/>
           </a:p>
@@ -672,7 +691,7 @@
           <p:cNvPr id="5" name="Footer Placeholder 4">
             <a:extLst>
               <a:ext uri="{FF2B5EF4-FFF2-40B4-BE49-F238E27FC236}">
-                <a16:creationId xmlns:a16="http://schemas.microsoft.com/office/drawing/2014/main" xmlns="" id="{6A181D81-2CCF-4506-BAC8-332F27972DE7}"/>
+                <a16:creationId xmlns="" xmlns:a16="http://schemas.microsoft.com/office/drawing/2014/main" id="{6A181D81-2CCF-4506-BAC8-332F27972DE7}"/>
               </a:ext>
             </a:extLst>
           </p:cNvPr>
@@ -697,7 +716,7 @@
           <p:cNvPr id="6" name="Slide Number Placeholder 5">
             <a:extLst>
               <a:ext uri="{FF2B5EF4-FFF2-40B4-BE49-F238E27FC236}">
-                <a16:creationId xmlns:a16="http://schemas.microsoft.com/office/drawing/2014/main" xmlns="" id="{CF493655-0420-4B38-BA94-CAA81BE6B4A5}"/>
+                <a16:creationId xmlns="" xmlns:a16="http://schemas.microsoft.com/office/drawing/2014/main" id="{CF493655-0420-4B38-BA94-CAA81BE6B4A5}"/>
               </a:ext>
             </a:extLst>
           </p:cNvPr>
@@ -756,7 +775,7 @@
           <p:cNvPr id="2" name="Title 1">
             <a:extLst>
               <a:ext uri="{FF2B5EF4-FFF2-40B4-BE49-F238E27FC236}">
-                <a16:creationId xmlns:a16="http://schemas.microsoft.com/office/drawing/2014/main" xmlns="" id="{93BACEFF-B6D7-4BFD-B93D-95821BFD2D8F}"/>
+                <a16:creationId xmlns="" xmlns:a16="http://schemas.microsoft.com/office/drawing/2014/main" id="{93BACEFF-B6D7-4BFD-B93D-95821BFD2D8F}"/>
               </a:ext>
             </a:extLst>
           </p:cNvPr>
@@ -784,7 +803,7 @@
           <p:cNvPr id="3" name="Content Placeholder 2">
             <a:extLst>
               <a:ext uri="{FF2B5EF4-FFF2-40B4-BE49-F238E27FC236}">
-                <a16:creationId xmlns:a16="http://schemas.microsoft.com/office/drawing/2014/main" xmlns="" id="{59385ED6-5E0D-4E26-B486-3CC0C4291B3B}"/>
+                <a16:creationId xmlns="" xmlns:a16="http://schemas.microsoft.com/office/drawing/2014/main" id="{59385ED6-5E0D-4E26-B486-3CC0C4291B3B}"/>
               </a:ext>
             </a:extLst>
           </p:cNvPr>
@@ -841,7 +860,7 @@
           <p:cNvPr id="4" name="Date Placeholder 3">
             <a:extLst>
               <a:ext uri="{FF2B5EF4-FFF2-40B4-BE49-F238E27FC236}">
-                <a16:creationId xmlns:a16="http://schemas.microsoft.com/office/drawing/2014/main" xmlns="" id="{4FC036BA-799C-484E-9202-7D281BB13E19}"/>
+                <a16:creationId xmlns="" xmlns:a16="http://schemas.microsoft.com/office/drawing/2014/main" id="{4FC036BA-799C-484E-9202-7D281BB13E19}"/>
               </a:ext>
             </a:extLst>
           </p:cNvPr>
@@ -859,7 +878,7 @@
           <a:p>
             <a:fld id="{E040DD28-DA01-4164-BF9D-AEC6AAD07A3E}" type="datetimeFigureOut">
               <a:rPr lang="en-US" smtClean="0"/>
-              <a:t>12/25/2017</a:t>
+              <a:t>1/5/18</a:t>
             </a:fld>
             <a:endParaRPr lang="en-US"/>
           </a:p>
@@ -870,7 +889,7 @@
           <p:cNvPr id="5" name="Footer Placeholder 4">
             <a:extLst>
               <a:ext uri="{FF2B5EF4-FFF2-40B4-BE49-F238E27FC236}">
-                <a16:creationId xmlns:a16="http://schemas.microsoft.com/office/drawing/2014/main" xmlns="" id="{84C705AF-ED38-4DC0-9CAD-82802278E609}"/>
+                <a16:creationId xmlns="" xmlns:a16="http://schemas.microsoft.com/office/drawing/2014/main" id="{84C705AF-ED38-4DC0-9CAD-82802278E609}"/>
               </a:ext>
             </a:extLst>
           </p:cNvPr>
@@ -895,7 +914,7 @@
           <p:cNvPr id="6" name="Slide Number Placeholder 5">
             <a:extLst>
               <a:ext uri="{FF2B5EF4-FFF2-40B4-BE49-F238E27FC236}">
-                <a16:creationId xmlns:a16="http://schemas.microsoft.com/office/drawing/2014/main" xmlns="" id="{FCAB4C5E-BC29-4DA3-8FDD-E88F20A62425}"/>
+                <a16:creationId xmlns="" xmlns:a16="http://schemas.microsoft.com/office/drawing/2014/main" id="{FCAB4C5E-BC29-4DA3-8FDD-E88F20A62425}"/>
               </a:ext>
             </a:extLst>
           </p:cNvPr>
@@ -954,7 +973,7 @@
           <p:cNvPr id="2" name="Title 1">
             <a:extLst>
               <a:ext uri="{FF2B5EF4-FFF2-40B4-BE49-F238E27FC236}">
-                <a16:creationId xmlns:a16="http://schemas.microsoft.com/office/drawing/2014/main" xmlns="" id="{56F4E2A8-3DB4-4F28-996A-ADBBE22EB9E6}"/>
+                <a16:creationId xmlns="" xmlns:a16="http://schemas.microsoft.com/office/drawing/2014/main" id="{56F4E2A8-3DB4-4F28-996A-ADBBE22EB9E6}"/>
               </a:ext>
             </a:extLst>
           </p:cNvPr>
@@ -991,7 +1010,7 @@
           <p:cNvPr id="3" name="Text Placeholder 2">
             <a:extLst>
               <a:ext uri="{FF2B5EF4-FFF2-40B4-BE49-F238E27FC236}">
-                <a16:creationId xmlns:a16="http://schemas.microsoft.com/office/drawing/2014/main" xmlns="" id="{C89AE634-E835-4FB2-9543-9AE7D101C6F8}"/>
+                <a16:creationId xmlns="" xmlns:a16="http://schemas.microsoft.com/office/drawing/2014/main" id="{C89AE634-E835-4FB2-9543-9AE7D101C6F8}"/>
               </a:ext>
             </a:extLst>
           </p:cNvPr>
@@ -1116,7 +1135,7 @@
           <p:cNvPr id="4" name="Date Placeholder 3">
             <a:extLst>
               <a:ext uri="{FF2B5EF4-FFF2-40B4-BE49-F238E27FC236}">
-                <a16:creationId xmlns:a16="http://schemas.microsoft.com/office/drawing/2014/main" xmlns="" id="{A80E8D62-561D-425F-95E0-D8B490FEAFB0}"/>
+                <a16:creationId xmlns="" xmlns:a16="http://schemas.microsoft.com/office/drawing/2014/main" id="{A80E8D62-561D-425F-95E0-D8B490FEAFB0}"/>
               </a:ext>
             </a:extLst>
           </p:cNvPr>
@@ -1134,7 +1153,7 @@
           <a:p>
             <a:fld id="{E040DD28-DA01-4164-BF9D-AEC6AAD07A3E}" type="datetimeFigureOut">
               <a:rPr lang="en-US" smtClean="0"/>
-              <a:t>12/25/2017</a:t>
+              <a:t>1/5/18</a:t>
             </a:fld>
             <a:endParaRPr lang="en-US"/>
           </a:p>
@@ -1145,7 +1164,7 @@
           <p:cNvPr id="5" name="Footer Placeholder 4">
             <a:extLst>
               <a:ext uri="{FF2B5EF4-FFF2-40B4-BE49-F238E27FC236}">
-                <a16:creationId xmlns:a16="http://schemas.microsoft.com/office/drawing/2014/main" xmlns="" id="{092BFE70-3129-4F21-A151-027B995D8283}"/>
+                <a16:creationId xmlns="" xmlns:a16="http://schemas.microsoft.com/office/drawing/2014/main" id="{092BFE70-3129-4F21-A151-027B995D8283}"/>
               </a:ext>
             </a:extLst>
           </p:cNvPr>
@@ -1170,7 +1189,7 @@
           <p:cNvPr id="6" name="Slide Number Placeholder 5">
             <a:extLst>
               <a:ext uri="{FF2B5EF4-FFF2-40B4-BE49-F238E27FC236}">
-                <a16:creationId xmlns:a16="http://schemas.microsoft.com/office/drawing/2014/main" xmlns="" id="{8021D42E-9379-4CA1-8E67-A8CFC2137736}"/>
+                <a16:creationId xmlns="" xmlns:a16="http://schemas.microsoft.com/office/drawing/2014/main" id="{8021D42E-9379-4CA1-8E67-A8CFC2137736}"/>
               </a:ext>
             </a:extLst>
           </p:cNvPr>
@@ -1229,7 +1248,7 @@
           <p:cNvPr id="2" name="Title 1">
             <a:extLst>
               <a:ext uri="{FF2B5EF4-FFF2-40B4-BE49-F238E27FC236}">
-                <a16:creationId xmlns:a16="http://schemas.microsoft.com/office/drawing/2014/main" xmlns="" id="{6E79E456-1075-4906-82F7-0E6109B9E35D}"/>
+                <a16:creationId xmlns="" xmlns:a16="http://schemas.microsoft.com/office/drawing/2014/main" id="{6E79E456-1075-4906-82F7-0E6109B9E35D}"/>
               </a:ext>
             </a:extLst>
           </p:cNvPr>
@@ -1257,7 +1276,7 @@
           <p:cNvPr id="3" name="Content Placeholder 2">
             <a:extLst>
               <a:ext uri="{FF2B5EF4-FFF2-40B4-BE49-F238E27FC236}">
-                <a16:creationId xmlns:a16="http://schemas.microsoft.com/office/drawing/2014/main" xmlns="" id="{5B119237-D568-4846-9810-EE66DFA84982}"/>
+                <a16:creationId xmlns="" xmlns:a16="http://schemas.microsoft.com/office/drawing/2014/main" id="{5B119237-D568-4846-9810-EE66DFA84982}"/>
               </a:ext>
             </a:extLst>
           </p:cNvPr>
@@ -1319,7 +1338,7 @@
           <p:cNvPr id="4" name="Content Placeholder 3">
             <a:extLst>
               <a:ext uri="{FF2B5EF4-FFF2-40B4-BE49-F238E27FC236}">
-                <a16:creationId xmlns:a16="http://schemas.microsoft.com/office/drawing/2014/main" xmlns="" id="{B4C29F7A-057C-4495-9330-75B170FD1A8C}"/>
+                <a16:creationId xmlns="" xmlns:a16="http://schemas.microsoft.com/office/drawing/2014/main" id="{B4C29F7A-057C-4495-9330-75B170FD1A8C}"/>
               </a:ext>
             </a:extLst>
           </p:cNvPr>
@@ -1381,7 +1400,7 @@
           <p:cNvPr id="5" name="Date Placeholder 4">
             <a:extLst>
               <a:ext uri="{FF2B5EF4-FFF2-40B4-BE49-F238E27FC236}">
-                <a16:creationId xmlns:a16="http://schemas.microsoft.com/office/drawing/2014/main" xmlns="" id="{6B9731BB-E5EB-4386-A8C4-02BCBE618022}"/>
+                <a16:creationId xmlns="" xmlns:a16="http://schemas.microsoft.com/office/drawing/2014/main" id="{6B9731BB-E5EB-4386-A8C4-02BCBE618022}"/>
               </a:ext>
             </a:extLst>
           </p:cNvPr>
@@ -1399,7 +1418,7 @@
           <a:p>
             <a:fld id="{E040DD28-DA01-4164-BF9D-AEC6AAD07A3E}" type="datetimeFigureOut">
               <a:rPr lang="en-US" smtClean="0"/>
-              <a:t>12/25/2017</a:t>
+              <a:t>1/5/18</a:t>
             </a:fld>
             <a:endParaRPr lang="en-US"/>
           </a:p>
@@ -1410,7 +1429,7 @@
           <p:cNvPr id="6" name="Footer Placeholder 5">
             <a:extLst>
               <a:ext uri="{FF2B5EF4-FFF2-40B4-BE49-F238E27FC236}">
-                <a16:creationId xmlns:a16="http://schemas.microsoft.com/office/drawing/2014/main" xmlns="" id="{D61D5281-CDA5-43EF-BE1C-79A1529A08DB}"/>
+                <a16:creationId xmlns="" xmlns:a16="http://schemas.microsoft.com/office/drawing/2014/main" id="{D61D5281-CDA5-43EF-BE1C-79A1529A08DB}"/>
               </a:ext>
             </a:extLst>
           </p:cNvPr>
@@ -1435,7 +1454,7 @@
           <p:cNvPr id="7" name="Slide Number Placeholder 6">
             <a:extLst>
               <a:ext uri="{FF2B5EF4-FFF2-40B4-BE49-F238E27FC236}">
-                <a16:creationId xmlns:a16="http://schemas.microsoft.com/office/drawing/2014/main" xmlns="" id="{39B30A33-21E5-4395-AB23-BAC1B5A92289}"/>
+                <a16:creationId xmlns="" xmlns:a16="http://schemas.microsoft.com/office/drawing/2014/main" id="{39B30A33-21E5-4395-AB23-BAC1B5A92289}"/>
               </a:ext>
             </a:extLst>
           </p:cNvPr>
@@ -1494,7 +1513,7 @@
           <p:cNvPr id="2" name="Title 1">
             <a:extLst>
               <a:ext uri="{FF2B5EF4-FFF2-40B4-BE49-F238E27FC236}">
-                <a16:creationId xmlns:a16="http://schemas.microsoft.com/office/drawing/2014/main" xmlns="" id="{37B4C097-07A2-4984-A86D-7F052CFF4886}"/>
+                <a16:creationId xmlns="" xmlns:a16="http://schemas.microsoft.com/office/drawing/2014/main" id="{37B4C097-07A2-4984-A86D-7F052CFF4886}"/>
               </a:ext>
             </a:extLst>
           </p:cNvPr>
@@ -1527,7 +1546,7 @@
           <p:cNvPr id="3" name="Text Placeholder 2">
             <a:extLst>
               <a:ext uri="{FF2B5EF4-FFF2-40B4-BE49-F238E27FC236}">
-                <a16:creationId xmlns:a16="http://schemas.microsoft.com/office/drawing/2014/main" xmlns="" id="{586C90C0-904E-436B-996B-03DD09FE05C4}"/>
+                <a16:creationId xmlns="" xmlns:a16="http://schemas.microsoft.com/office/drawing/2014/main" id="{586C90C0-904E-436B-996B-03DD09FE05C4}"/>
               </a:ext>
             </a:extLst>
           </p:cNvPr>
@@ -1598,7 +1617,7 @@
           <p:cNvPr id="4" name="Content Placeholder 3">
             <a:extLst>
               <a:ext uri="{FF2B5EF4-FFF2-40B4-BE49-F238E27FC236}">
-                <a16:creationId xmlns:a16="http://schemas.microsoft.com/office/drawing/2014/main" xmlns="" id="{E03CBD82-3AD3-4E06-90BB-01B87FA81FC7}"/>
+                <a16:creationId xmlns="" xmlns:a16="http://schemas.microsoft.com/office/drawing/2014/main" id="{E03CBD82-3AD3-4E06-90BB-01B87FA81FC7}"/>
               </a:ext>
             </a:extLst>
           </p:cNvPr>
@@ -1660,7 +1679,7 @@
           <p:cNvPr id="5" name="Text Placeholder 4">
             <a:extLst>
               <a:ext uri="{FF2B5EF4-FFF2-40B4-BE49-F238E27FC236}">
-                <a16:creationId xmlns:a16="http://schemas.microsoft.com/office/drawing/2014/main" xmlns="" id="{04ACE262-BFED-4131-A5BA-E0278B00A663}"/>
+                <a16:creationId xmlns="" xmlns:a16="http://schemas.microsoft.com/office/drawing/2014/main" id="{04ACE262-BFED-4131-A5BA-E0278B00A663}"/>
               </a:ext>
             </a:extLst>
           </p:cNvPr>
@@ -1731,7 +1750,7 @@
           <p:cNvPr id="6" name="Content Placeholder 5">
             <a:extLst>
               <a:ext uri="{FF2B5EF4-FFF2-40B4-BE49-F238E27FC236}">
-                <a16:creationId xmlns:a16="http://schemas.microsoft.com/office/drawing/2014/main" xmlns="" id="{1BC543A8-1DAB-4F64-93C3-0EB766AE86F9}"/>
+                <a16:creationId xmlns="" xmlns:a16="http://schemas.microsoft.com/office/drawing/2014/main" id="{1BC543A8-1DAB-4F64-93C3-0EB766AE86F9}"/>
               </a:ext>
             </a:extLst>
           </p:cNvPr>
@@ -1793,7 +1812,7 @@
           <p:cNvPr id="7" name="Date Placeholder 6">
             <a:extLst>
               <a:ext uri="{FF2B5EF4-FFF2-40B4-BE49-F238E27FC236}">
-                <a16:creationId xmlns:a16="http://schemas.microsoft.com/office/drawing/2014/main" xmlns="" id="{DBF0794B-2DF7-43D8-8A0C-752A3C841A95}"/>
+                <a16:creationId xmlns="" xmlns:a16="http://schemas.microsoft.com/office/drawing/2014/main" id="{DBF0794B-2DF7-43D8-8A0C-752A3C841A95}"/>
               </a:ext>
             </a:extLst>
           </p:cNvPr>
@@ -1811,7 +1830,7 @@
           <a:p>
             <a:fld id="{E040DD28-DA01-4164-BF9D-AEC6AAD07A3E}" type="datetimeFigureOut">
               <a:rPr lang="en-US" smtClean="0"/>
-              <a:t>12/25/2017</a:t>
+              <a:t>1/5/18</a:t>
             </a:fld>
             <a:endParaRPr lang="en-US"/>
           </a:p>
@@ -1822,7 +1841,7 @@
           <p:cNvPr id="8" name="Footer Placeholder 7">
             <a:extLst>
               <a:ext uri="{FF2B5EF4-FFF2-40B4-BE49-F238E27FC236}">
-                <a16:creationId xmlns:a16="http://schemas.microsoft.com/office/drawing/2014/main" xmlns="" id="{15BFDF4B-45AB-4776-B148-1F4FA0BCD9A6}"/>
+                <a16:creationId xmlns="" xmlns:a16="http://schemas.microsoft.com/office/drawing/2014/main" id="{15BFDF4B-45AB-4776-B148-1F4FA0BCD9A6}"/>
               </a:ext>
             </a:extLst>
           </p:cNvPr>
@@ -1847,7 +1866,7 @@
           <p:cNvPr id="9" name="Slide Number Placeholder 8">
             <a:extLst>
               <a:ext uri="{FF2B5EF4-FFF2-40B4-BE49-F238E27FC236}">
-                <a16:creationId xmlns:a16="http://schemas.microsoft.com/office/drawing/2014/main" xmlns="" id="{74ACFCD8-1AA0-4174-A68D-6293F9717D99}"/>
+                <a16:creationId xmlns="" xmlns:a16="http://schemas.microsoft.com/office/drawing/2014/main" id="{74ACFCD8-1AA0-4174-A68D-6293F9717D99}"/>
               </a:ext>
             </a:extLst>
           </p:cNvPr>
@@ -1906,7 +1925,7 @@
           <p:cNvPr id="2" name="Title 1">
             <a:extLst>
               <a:ext uri="{FF2B5EF4-FFF2-40B4-BE49-F238E27FC236}">
-                <a16:creationId xmlns:a16="http://schemas.microsoft.com/office/drawing/2014/main" xmlns="" id="{A9F3CBAC-2073-439B-B8DE-FB80422902CE}"/>
+                <a16:creationId xmlns="" xmlns:a16="http://schemas.microsoft.com/office/drawing/2014/main" id="{A9F3CBAC-2073-439B-B8DE-FB80422902CE}"/>
               </a:ext>
             </a:extLst>
           </p:cNvPr>
@@ -1934,7 +1953,7 @@
           <p:cNvPr id="3" name="Date Placeholder 2">
             <a:extLst>
               <a:ext uri="{FF2B5EF4-FFF2-40B4-BE49-F238E27FC236}">
-                <a16:creationId xmlns:a16="http://schemas.microsoft.com/office/drawing/2014/main" xmlns="" id="{06A84D4C-CD47-42D3-8505-872676C28963}"/>
+                <a16:creationId xmlns="" xmlns:a16="http://schemas.microsoft.com/office/drawing/2014/main" id="{06A84D4C-CD47-42D3-8505-872676C28963}"/>
               </a:ext>
             </a:extLst>
           </p:cNvPr>
@@ -1952,7 +1971,7 @@
           <a:p>
             <a:fld id="{E040DD28-DA01-4164-BF9D-AEC6AAD07A3E}" type="datetimeFigureOut">
               <a:rPr lang="en-US" smtClean="0"/>
-              <a:t>12/25/2017</a:t>
+              <a:t>1/5/18</a:t>
             </a:fld>
             <a:endParaRPr lang="en-US"/>
           </a:p>
@@ -1963,7 +1982,7 @@
           <p:cNvPr id="4" name="Footer Placeholder 3">
             <a:extLst>
               <a:ext uri="{FF2B5EF4-FFF2-40B4-BE49-F238E27FC236}">
-                <a16:creationId xmlns:a16="http://schemas.microsoft.com/office/drawing/2014/main" xmlns="" id="{B784711A-B8EA-4963-A653-27EE2997119F}"/>
+                <a16:creationId xmlns="" xmlns:a16="http://schemas.microsoft.com/office/drawing/2014/main" id="{B784711A-B8EA-4963-A653-27EE2997119F}"/>
               </a:ext>
             </a:extLst>
           </p:cNvPr>
@@ -1988,7 +2007,7 @@
           <p:cNvPr id="5" name="Slide Number Placeholder 4">
             <a:extLst>
               <a:ext uri="{FF2B5EF4-FFF2-40B4-BE49-F238E27FC236}">
-                <a16:creationId xmlns:a16="http://schemas.microsoft.com/office/drawing/2014/main" xmlns="" id="{9BD0276A-CA50-4B27-9DF4-12C17991F3AD}"/>
+                <a16:creationId xmlns="" xmlns:a16="http://schemas.microsoft.com/office/drawing/2014/main" id="{9BD0276A-CA50-4B27-9DF4-12C17991F3AD}"/>
               </a:ext>
             </a:extLst>
           </p:cNvPr>
@@ -2047,7 +2066,7 @@
           <p:cNvPr id="2" name="Date Placeholder 1">
             <a:extLst>
               <a:ext uri="{FF2B5EF4-FFF2-40B4-BE49-F238E27FC236}">
-                <a16:creationId xmlns:a16="http://schemas.microsoft.com/office/drawing/2014/main" xmlns="" id="{CBE24604-C75B-4F9D-8382-AC380D5DD668}"/>
+                <a16:creationId xmlns="" xmlns:a16="http://schemas.microsoft.com/office/drawing/2014/main" id="{CBE24604-C75B-4F9D-8382-AC380D5DD668}"/>
               </a:ext>
             </a:extLst>
           </p:cNvPr>
@@ -2065,7 +2084,7 @@
           <a:p>
             <a:fld id="{E040DD28-DA01-4164-BF9D-AEC6AAD07A3E}" type="datetimeFigureOut">
               <a:rPr lang="en-US" smtClean="0"/>
-              <a:t>12/25/2017</a:t>
+              <a:t>1/5/18</a:t>
             </a:fld>
             <a:endParaRPr lang="en-US"/>
           </a:p>
@@ -2076,7 +2095,7 @@
           <p:cNvPr id="3" name="Footer Placeholder 2">
             <a:extLst>
               <a:ext uri="{FF2B5EF4-FFF2-40B4-BE49-F238E27FC236}">
-                <a16:creationId xmlns:a16="http://schemas.microsoft.com/office/drawing/2014/main" xmlns="" id="{2641AA10-AE31-466F-96AF-31A1A0955AD1}"/>
+                <a16:creationId xmlns="" xmlns:a16="http://schemas.microsoft.com/office/drawing/2014/main" id="{2641AA10-AE31-466F-96AF-31A1A0955AD1}"/>
               </a:ext>
             </a:extLst>
           </p:cNvPr>
@@ -2101,7 +2120,7 @@
           <p:cNvPr id="4" name="Slide Number Placeholder 3">
             <a:extLst>
               <a:ext uri="{FF2B5EF4-FFF2-40B4-BE49-F238E27FC236}">
-                <a16:creationId xmlns:a16="http://schemas.microsoft.com/office/drawing/2014/main" xmlns="" id="{756609DE-ABCC-4735-9687-532D469DC4E2}"/>
+                <a16:creationId xmlns="" xmlns:a16="http://schemas.microsoft.com/office/drawing/2014/main" id="{756609DE-ABCC-4735-9687-532D469DC4E2}"/>
               </a:ext>
             </a:extLst>
           </p:cNvPr>
@@ -2160,7 +2179,7 @@
           <p:cNvPr id="2" name="Title 1">
             <a:extLst>
               <a:ext uri="{FF2B5EF4-FFF2-40B4-BE49-F238E27FC236}">
-                <a16:creationId xmlns:a16="http://schemas.microsoft.com/office/drawing/2014/main" xmlns="" id="{70B034F0-2116-43B6-A3DF-533AE5CE39CE}"/>
+                <a16:creationId xmlns="" xmlns:a16="http://schemas.microsoft.com/office/drawing/2014/main" id="{70B034F0-2116-43B6-A3DF-533AE5CE39CE}"/>
               </a:ext>
             </a:extLst>
           </p:cNvPr>
@@ -2197,7 +2216,7 @@
           <p:cNvPr id="3" name="Content Placeholder 2">
             <a:extLst>
               <a:ext uri="{FF2B5EF4-FFF2-40B4-BE49-F238E27FC236}">
-                <a16:creationId xmlns:a16="http://schemas.microsoft.com/office/drawing/2014/main" xmlns="" id="{5B8FA73E-8222-4BD6-84B5-93652E6DEF4C}"/>
+                <a16:creationId xmlns="" xmlns:a16="http://schemas.microsoft.com/office/drawing/2014/main" id="{5B8FA73E-8222-4BD6-84B5-93652E6DEF4C}"/>
               </a:ext>
             </a:extLst>
           </p:cNvPr>
@@ -2287,7 +2306,7 @@
           <p:cNvPr id="4" name="Text Placeholder 3">
             <a:extLst>
               <a:ext uri="{FF2B5EF4-FFF2-40B4-BE49-F238E27FC236}">
-                <a16:creationId xmlns:a16="http://schemas.microsoft.com/office/drawing/2014/main" xmlns="" id="{070680AD-0DF4-407C-815A-B6FC0B7A7F1E}"/>
+                <a16:creationId xmlns="" xmlns:a16="http://schemas.microsoft.com/office/drawing/2014/main" id="{070680AD-0DF4-407C-815A-B6FC0B7A7F1E}"/>
               </a:ext>
             </a:extLst>
           </p:cNvPr>
@@ -2358,7 +2377,7 @@
           <p:cNvPr id="5" name="Date Placeholder 4">
             <a:extLst>
               <a:ext uri="{FF2B5EF4-FFF2-40B4-BE49-F238E27FC236}">
-                <a16:creationId xmlns:a16="http://schemas.microsoft.com/office/drawing/2014/main" xmlns="" id="{D828C134-AC88-45CD-8C31-4BAB0E6B3390}"/>
+                <a16:creationId xmlns="" xmlns:a16="http://schemas.microsoft.com/office/drawing/2014/main" id="{D828C134-AC88-45CD-8C31-4BAB0E6B3390}"/>
               </a:ext>
             </a:extLst>
           </p:cNvPr>
@@ -2376,7 +2395,7 @@
           <a:p>
             <a:fld id="{E040DD28-DA01-4164-BF9D-AEC6AAD07A3E}" type="datetimeFigureOut">
               <a:rPr lang="en-US" smtClean="0"/>
-              <a:t>12/25/2017</a:t>
+              <a:t>1/5/18</a:t>
             </a:fld>
             <a:endParaRPr lang="en-US"/>
           </a:p>
@@ -2387,7 +2406,7 @@
           <p:cNvPr id="6" name="Footer Placeholder 5">
             <a:extLst>
               <a:ext uri="{FF2B5EF4-FFF2-40B4-BE49-F238E27FC236}">
-                <a16:creationId xmlns:a16="http://schemas.microsoft.com/office/drawing/2014/main" xmlns="" id="{A6BCAE05-6F4C-44B9-A59A-E9435FAE141A}"/>
+                <a16:creationId xmlns="" xmlns:a16="http://schemas.microsoft.com/office/drawing/2014/main" id="{A6BCAE05-6F4C-44B9-A59A-E9435FAE141A}"/>
               </a:ext>
             </a:extLst>
           </p:cNvPr>
@@ -2412,7 +2431,7 @@
           <p:cNvPr id="7" name="Slide Number Placeholder 6">
             <a:extLst>
               <a:ext uri="{FF2B5EF4-FFF2-40B4-BE49-F238E27FC236}">
-                <a16:creationId xmlns:a16="http://schemas.microsoft.com/office/drawing/2014/main" xmlns="" id="{F3033C98-CC7D-4B89-8DEA-9E1C9B62C714}"/>
+                <a16:creationId xmlns="" xmlns:a16="http://schemas.microsoft.com/office/drawing/2014/main" id="{F3033C98-CC7D-4B89-8DEA-9E1C9B62C714}"/>
               </a:ext>
             </a:extLst>
           </p:cNvPr>
@@ -2471,7 +2490,7 @@
           <p:cNvPr id="2" name="Title 1">
             <a:extLst>
               <a:ext uri="{FF2B5EF4-FFF2-40B4-BE49-F238E27FC236}">
-                <a16:creationId xmlns:a16="http://schemas.microsoft.com/office/drawing/2014/main" xmlns="" id="{C5C61AB1-B345-446E-A14A-919A9FE596A9}"/>
+                <a16:creationId xmlns="" xmlns:a16="http://schemas.microsoft.com/office/drawing/2014/main" id="{C5C61AB1-B345-446E-A14A-919A9FE596A9}"/>
               </a:ext>
             </a:extLst>
           </p:cNvPr>
@@ -2508,7 +2527,7 @@
           <p:cNvPr id="3" name="Picture Placeholder 2">
             <a:extLst>
               <a:ext uri="{FF2B5EF4-FFF2-40B4-BE49-F238E27FC236}">
-                <a16:creationId xmlns:a16="http://schemas.microsoft.com/office/drawing/2014/main" xmlns="" id="{C8FC6971-C8D3-41FA-9E59-9267B41B86D7}"/>
+                <a16:creationId xmlns="" xmlns:a16="http://schemas.microsoft.com/office/drawing/2014/main" id="{C8FC6971-C8D3-41FA-9E59-9267B41B86D7}"/>
               </a:ext>
             </a:extLst>
           </p:cNvPr>
@@ -2575,7 +2594,7 @@
           <p:cNvPr id="4" name="Text Placeholder 3">
             <a:extLst>
               <a:ext uri="{FF2B5EF4-FFF2-40B4-BE49-F238E27FC236}">
-                <a16:creationId xmlns:a16="http://schemas.microsoft.com/office/drawing/2014/main" xmlns="" id="{6D3E27C0-ECF1-4974-89DC-5E5F1753643D}"/>
+                <a16:creationId xmlns="" xmlns:a16="http://schemas.microsoft.com/office/drawing/2014/main" id="{6D3E27C0-ECF1-4974-89DC-5E5F1753643D}"/>
               </a:ext>
             </a:extLst>
           </p:cNvPr>
@@ -2646,7 +2665,7 @@
           <p:cNvPr id="5" name="Date Placeholder 4">
             <a:extLst>
               <a:ext uri="{FF2B5EF4-FFF2-40B4-BE49-F238E27FC236}">
-                <a16:creationId xmlns:a16="http://schemas.microsoft.com/office/drawing/2014/main" xmlns="" id="{EB0CF908-7B88-457C-A7CB-BA8E59EFE6B1}"/>
+                <a16:creationId xmlns="" xmlns:a16="http://schemas.microsoft.com/office/drawing/2014/main" id="{EB0CF908-7B88-457C-A7CB-BA8E59EFE6B1}"/>
               </a:ext>
             </a:extLst>
           </p:cNvPr>
@@ -2664,7 +2683,7 @@
           <a:p>
             <a:fld id="{E040DD28-DA01-4164-BF9D-AEC6AAD07A3E}" type="datetimeFigureOut">
               <a:rPr lang="en-US" smtClean="0"/>
-              <a:t>12/25/2017</a:t>
+              <a:t>1/5/18</a:t>
             </a:fld>
             <a:endParaRPr lang="en-US"/>
           </a:p>
@@ -2675,7 +2694,7 @@
           <p:cNvPr id="6" name="Footer Placeholder 5">
             <a:extLst>
               <a:ext uri="{FF2B5EF4-FFF2-40B4-BE49-F238E27FC236}">
-                <a16:creationId xmlns:a16="http://schemas.microsoft.com/office/drawing/2014/main" xmlns="" id="{9EFEFD02-5829-4D99-8387-FA6DDA7FDCE6}"/>
+                <a16:creationId xmlns="" xmlns:a16="http://schemas.microsoft.com/office/drawing/2014/main" id="{9EFEFD02-5829-4D99-8387-FA6DDA7FDCE6}"/>
               </a:ext>
             </a:extLst>
           </p:cNvPr>
@@ -2700,7 +2719,7 @@
           <p:cNvPr id="7" name="Slide Number Placeholder 6">
             <a:extLst>
               <a:ext uri="{FF2B5EF4-FFF2-40B4-BE49-F238E27FC236}">
-                <a16:creationId xmlns:a16="http://schemas.microsoft.com/office/drawing/2014/main" xmlns="" id="{CC83D447-B6BD-4EB6-84FA-277F982BD485}"/>
+                <a16:creationId xmlns="" xmlns:a16="http://schemas.microsoft.com/office/drawing/2014/main" id="{CC83D447-B6BD-4EB6-84FA-277F982BD485}"/>
               </a:ext>
             </a:extLst>
           </p:cNvPr>
@@ -2764,7 +2783,7 @@
           <p:cNvPr id="2" name="Title Placeholder 1">
             <a:extLst>
               <a:ext uri="{FF2B5EF4-FFF2-40B4-BE49-F238E27FC236}">
-                <a16:creationId xmlns:a16="http://schemas.microsoft.com/office/drawing/2014/main" xmlns="" id="{BF4BEE1F-B564-43B7-B55B-42176FDCF6A5}"/>
+                <a16:creationId xmlns="" xmlns:a16="http://schemas.microsoft.com/office/drawing/2014/main" id="{BF4BEE1F-B564-43B7-B55B-42176FDCF6A5}"/>
               </a:ext>
             </a:extLst>
           </p:cNvPr>
@@ -2802,7 +2821,7 @@
           <p:cNvPr id="3" name="Text Placeholder 2">
             <a:extLst>
               <a:ext uri="{FF2B5EF4-FFF2-40B4-BE49-F238E27FC236}">
-                <a16:creationId xmlns:a16="http://schemas.microsoft.com/office/drawing/2014/main" xmlns="" id="{C280B79D-E421-4AC8-A9C2-4B56DA344FB6}"/>
+                <a16:creationId xmlns="" xmlns:a16="http://schemas.microsoft.com/office/drawing/2014/main" id="{C280B79D-E421-4AC8-A9C2-4B56DA344FB6}"/>
               </a:ext>
             </a:extLst>
           </p:cNvPr>
@@ -2869,7 +2888,7 @@
           <p:cNvPr id="4" name="Date Placeholder 3">
             <a:extLst>
               <a:ext uri="{FF2B5EF4-FFF2-40B4-BE49-F238E27FC236}">
-                <a16:creationId xmlns:a16="http://schemas.microsoft.com/office/drawing/2014/main" xmlns="" id="{5805F7AC-3768-4B7D-A30D-D8CB381EF3DC}"/>
+                <a16:creationId xmlns="" xmlns:a16="http://schemas.microsoft.com/office/drawing/2014/main" id="{5805F7AC-3768-4B7D-A30D-D8CB381EF3DC}"/>
               </a:ext>
             </a:extLst>
           </p:cNvPr>
@@ -2905,7 +2924,7 @@
           <a:p>
             <a:fld id="{E040DD28-DA01-4164-BF9D-AEC6AAD07A3E}" type="datetimeFigureOut">
               <a:rPr lang="en-US" smtClean="0"/>
-              <a:t>12/25/2017</a:t>
+              <a:t>1/5/18</a:t>
             </a:fld>
             <a:endParaRPr lang="en-US"/>
           </a:p>
@@ -2916,7 +2935,7 @@
           <p:cNvPr id="5" name="Footer Placeholder 4">
             <a:extLst>
               <a:ext uri="{FF2B5EF4-FFF2-40B4-BE49-F238E27FC236}">
-                <a16:creationId xmlns:a16="http://schemas.microsoft.com/office/drawing/2014/main" xmlns="" id="{1F22F8AA-82E2-4EE1-A481-8556E12EA635}"/>
+                <a16:creationId xmlns="" xmlns:a16="http://schemas.microsoft.com/office/drawing/2014/main" id="{1F22F8AA-82E2-4EE1-A481-8556E12EA635}"/>
               </a:ext>
             </a:extLst>
           </p:cNvPr>
@@ -2959,7 +2978,7 @@
           <p:cNvPr id="6" name="Slide Number Placeholder 5">
             <a:extLst>
               <a:ext uri="{FF2B5EF4-FFF2-40B4-BE49-F238E27FC236}">
-                <a16:creationId xmlns:a16="http://schemas.microsoft.com/office/drawing/2014/main" xmlns="" id="{AEDE27F2-C1D2-4B19-8C04-6B34AC016DA7}"/>
+                <a16:creationId xmlns="" xmlns:a16="http://schemas.microsoft.com/office/drawing/2014/main" id="{AEDE27F2-C1D2-4B19-8C04-6B34AC016DA7}"/>
               </a:ext>
             </a:extLst>
           </p:cNvPr>
@@ -3305,6 +3324,351 @@
 </p:sldMaster>
 </file>
 
+<file path=ppt/slides/slide1.xml><?xml version="1.0" encoding="utf-8"?>
+<p:sld xmlns:a="http://schemas.openxmlformats.org/drawingml/2006/main" xmlns:r="http://schemas.openxmlformats.org/officeDocument/2006/relationships" xmlns:p="http://schemas.openxmlformats.org/presentationml/2006/main">
+  <p:cSld>
+    <p:spTree>
+      <p:nvGrpSpPr>
+        <p:cNvPr id="1" name=""/>
+        <p:cNvGrpSpPr/>
+        <p:nvPr/>
+      </p:nvGrpSpPr>
+      <p:grpSpPr>
+        <a:xfrm>
+          <a:off x="0" y="0"/>
+          <a:ext cx="0" cy="0"/>
+          <a:chOff x="0" y="0"/>
+          <a:chExt cx="0" cy="0"/>
+        </a:xfrm>
+      </p:grpSpPr>
+      <p:sp>
+        <p:nvSpPr>
+          <p:cNvPr id="2" name="Rectangle 1"/>
+          <p:cNvSpPr/>
+          <p:nvPr/>
+        </p:nvSpPr>
+        <p:spPr>
+          <a:xfrm>
+            <a:off x="1" y="0"/>
+            <a:ext cx="12192000" cy="2585323"/>
+          </a:xfrm>
+          <a:prstGeom prst="rect">
+            <a:avLst/>
+          </a:prstGeom>
+        </p:spPr>
+        <p:txBody>
+          <a:bodyPr wrap="square">
+            <a:spAutoFit/>
+          </a:bodyPr>
+          <a:lstStyle/>
+          <a:p>
+            <a:r>
+              <a:rPr lang="en-US" dirty="0">
+                <a:solidFill>
+                  <a:srgbClr val="757575"/>
+                </a:solidFill>
+                <a:latin typeface="Roboto" charset="0"/>
+              </a:rPr>
+              <a:t>Hardware Abstraction Layer (</a:t>
+            </a:r>
+            <a:r>
+              <a:rPr lang="en-US" b="1" dirty="0">
+                <a:solidFill>
+                  <a:srgbClr val="FF0000"/>
+                </a:solidFill>
+                <a:latin typeface="Roboto" charset="0"/>
+              </a:rPr>
+              <a:t>HAL</a:t>
+            </a:r>
+            <a:r>
+              <a:rPr lang="en-US" dirty="0" smtClean="0">
+                <a:solidFill>
+                  <a:srgbClr val="757575"/>
+                </a:solidFill>
+                <a:latin typeface="Roboto" charset="0"/>
+              </a:rPr>
+              <a:t>)</a:t>
+            </a:r>
+          </a:p>
+          <a:p>
+            <a:r>
+              <a:rPr lang="en-US" altLang="zh-CN" b="0" i="0" dirty="0" smtClean="0">
+                <a:solidFill>
+                  <a:srgbClr val="757575"/>
+                </a:solidFill>
+                <a:effectLst/>
+                <a:latin typeface="Roboto" charset="0"/>
+              </a:rPr>
+              <a:t>HAL</a:t>
+            </a:r>
+            <a:r>
+              <a:rPr lang="zh-CN" altLang="en-US" b="0" i="0" dirty="0" smtClean="0">
+                <a:solidFill>
+                  <a:srgbClr val="757575"/>
+                </a:solidFill>
+                <a:effectLst/>
+                <a:latin typeface="Roboto" charset="0"/>
+              </a:rPr>
+              <a:t>应该是</a:t>
+            </a:r>
+            <a:r>
+              <a:rPr lang="en-US" altLang="zh-CN" b="0" i="0" dirty="0" smtClean="0">
+                <a:solidFill>
+                  <a:srgbClr val="757575"/>
+                </a:solidFill>
+                <a:effectLst/>
+                <a:latin typeface="Roboto" charset="0"/>
+              </a:rPr>
+              <a:t>vendor</a:t>
+            </a:r>
+            <a:r>
+              <a:rPr lang="zh-CN" altLang="en-US" b="0" i="0" dirty="0" smtClean="0">
+                <a:solidFill>
+                  <a:srgbClr val="757575"/>
+                </a:solidFill>
+                <a:effectLst/>
+                <a:latin typeface="Roboto" charset="0"/>
+              </a:rPr>
+              <a:t>负责实装，一般是</a:t>
+            </a:r>
+            <a:r>
+              <a:rPr lang="en-US" altLang="zh-CN" b="0" i="0" dirty="0" smtClean="0">
+                <a:solidFill>
+                  <a:srgbClr val="757575"/>
+                </a:solidFill>
+                <a:effectLst/>
+                <a:latin typeface="Roboto" charset="0"/>
+              </a:rPr>
+              <a:t>.so</a:t>
+            </a:r>
+            <a:r>
+              <a:rPr lang="zh-CN" altLang="en-US" b="0" i="0" dirty="0" smtClean="0">
+                <a:solidFill>
+                  <a:srgbClr val="757575"/>
+                </a:solidFill>
+                <a:effectLst/>
+                <a:latin typeface="Roboto" charset="0"/>
+              </a:rPr>
+              <a:t>的形式</a:t>
+            </a:r>
+            <a:endParaRPr lang="en-US" altLang="zh-CN" b="0" i="0" dirty="0" smtClean="0">
+              <a:solidFill>
+                <a:srgbClr val="757575"/>
+              </a:solidFill>
+              <a:effectLst/>
+              <a:latin typeface="Roboto" charset="0"/>
+            </a:endParaRPr>
+          </a:p>
+          <a:p>
+            <a:r>
+              <a:rPr lang="en-US" dirty="0" smtClean="0"/>
+              <a:t>hardware/</a:t>
+            </a:r>
+            <a:r>
+              <a:rPr lang="en-US" dirty="0" err="1" smtClean="0"/>
+              <a:t>libhardware</a:t>
+            </a:r>
+            <a:r>
+              <a:rPr lang="en-US" dirty="0" smtClean="0"/>
+              <a:t>/include/hardware/</a:t>
+            </a:r>
+            <a:r>
+              <a:rPr lang="en-US" dirty="0" err="1" smtClean="0"/>
+              <a:t>hardware.h</a:t>
+            </a:r>
+            <a:r>
+              <a:rPr lang="zh-CN" altLang="en-US" dirty="0" smtClean="0"/>
+              <a:t> 中定义</a:t>
+            </a:r>
+            <a:r>
+              <a:rPr lang="en-US" altLang="zh-CN" dirty="0" smtClean="0"/>
+              <a:t>HAL</a:t>
+            </a:r>
+            <a:r>
+              <a:rPr lang="zh-CN" altLang="en-US" dirty="0" smtClean="0"/>
+              <a:t>的</a:t>
+            </a:r>
+            <a:r>
+              <a:rPr lang="en-US" altLang="zh-CN" dirty="0" smtClean="0"/>
+              <a:t>structure</a:t>
+            </a:r>
+          </a:p>
+          <a:p>
+            <a:r>
+              <a:rPr lang="zh-CN" altLang="en-US" b="0" i="0" dirty="0" smtClean="0">
+                <a:solidFill>
+                  <a:srgbClr val="757575"/>
+                </a:solidFill>
+                <a:effectLst/>
+                <a:latin typeface="Roboto" charset="0"/>
+              </a:rPr>
+              <a:t>为是么要</a:t>
+            </a:r>
+            <a:r>
+              <a:rPr lang="en-US" altLang="zh-CN" b="0" i="0" dirty="0" smtClean="0">
+                <a:solidFill>
+                  <a:srgbClr val="757575"/>
+                </a:solidFill>
+                <a:effectLst/>
+                <a:latin typeface="Roboto" charset="0"/>
+              </a:rPr>
+              <a:t>HAL</a:t>
+            </a:r>
+            <a:r>
+              <a:rPr lang="zh-CN" altLang="en-US" b="0" i="0" dirty="0" smtClean="0">
+                <a:solidFill>
+                  <a:srgbClr val="757575"/>
+                </a:solidFill>
+                <a:effectLst/>
+                <a:latin typeface="Roboto" charset="0"/>
+              </a:rPr>
+              <a:t>？</a:t>
+            </a:r>
+            <a:endParaRPr lang="en-US" altLang="zh-CN" b="0" i="0" dirty="0" smtClean="0">
+              <a:solidFill>
+                <a:srgbClr val="757575"/>
+              </a:solidFill>
+              <a:effectLst/>
+              <a:latin typeface="Roboto" charset="0"/>
+            </a:endParaRPr>
+          </a:p>
+          <a:p>
+            <a:pPr marL="285750" indent="-285750">
+              <a:buFont typeface="Arial" charset="0"/>
+              <a:buChar char="•"/>
+            </a:pPr>
+            <a:r>
+              <a:rPr lang="en-US" dirty="0"/>
+              <a:t>Android application/framework communicates with the underlying hardware through Java APIs not by system calls.</a:t>
+            </a:r>
+          </a:p>
+          <a:p>
+            <a:pPr marL="285750" indent="-285750">
+              <a:buFont typeface="Arial" charset="0"/>
+              <a:buChar char="•"/>
+            </a:pPr>
+            <a:r>
+              <a:rPr lang="en-US" dirty="0"/>
+              <a:t>But the Linux has the ability to handle only systems calls from application.</a:t>
+            </a:r>
+          </a:p>
+          <a:p>
+            <a:pPr marL="285750" indent="-285750">
+              <a:buFont typeface="Arial" charset="0"/>
+              <a:buChar char="•"/>
+            </a:pPr>
+            <a:r>
+              <a:rPr lang="en-US" dirty="0"/>
+              <a:t>Thus we need a glue layer between the android framework and </a:t>
+            </a:r>
+            <a:r>
+              <a:rPr lang="en-US" dirty="0" err="1"/>
+              <a:t>linux</a:t>
+            </a:r>
+            <a:r>
+              <a:rPr lang="en-US" dirty="0"/>
+              <a:t> </a:t>
+            </a:r>
+            <a:r>
+              <a:rPr lang="en-US" dirty="0" smtClean="0"/>
+              <a:t>system.</a:t>
+            </a:r>
+            <a:endParaRPr lang="en-US" dirty="0"/>
+          </a:p>
+          <a:p>
+            <a:r>
+              <a:rPr lang="zh-CN" altLang="en-US" dirty="0" smtClean="0"/>
+              <a:t>我的理解是，</a:t>
+            </a:r>
+            <a:r>
+              <a:rPr lang="en-US" altLang="zh-CN" dirty="0" smtClean="0"/>
+              <a:t>ODM</a:t>
+            </a:r>
+            <a:r>
+              <a:rPr lang="zh-CN" altLang="en-US" dirty="0" smtClean="0"/>
+              <a:t>自己决定要用什么硬件，</a:t>
+            </a:r>
+            <a:r>
+              <a:rPr lang="en-US" altLang="zh-CN" dirty="0" smtClean="0"/>
+              <a:t>Google</a:t>
+            </a:r>
+            <a:r>
+              <a:rPr lang="zh-CN" altLang="en-US" dirty="0" smtClean="0"/>
+              <a:t>提供</a:t>
+            </a:r>
+            <a:r>
+              <a:rPr lang="en-US" altLang="zh-CN" dirty="0" smtClean="0"/>
+              <a:t>Android</a:t>
+            </a:r>
+            <a:r>
+              <a:rPr lang="zh-CN" altLang="en-US" dirty="0" smtClean="0"/>
+              <a:t> </a:t>
+            </a:r>
+            <a:r>
+              <a:rPr lang="en-US" altLang="zh-CN" dirty="0" smtClean="0"/>
+              <a:t>platform</a:t>
+            </a:r>
+            <a:r>
+              <a:rPr lang="zh-CN" altLang="en-US" dirty="0"/>
+              <a:t> </a:t>
+            </a:r>
+            <a:r>
+              <a:rPr lang="zh-CN" altLang="en-US" dirty="0" smtClean="0"/>
+              <a:t>（</a:t>
+            </a:r>
+            <a:r>
+              <a:rPr lang="en-US" altLang="zh-CN" dirty="0" smtClean="0"/>
+              <a:t>Google</a:t>
+            </a:r>
+            <a:r>
+              <a:rPr lang="zh-CN" altLang="en-US" dirty="0" smtClean="0"/>
+              <a:t>并不知道硬件是什么）。为了使</a:t>
+            </a:r>
+            <a:r>
+              <a:rPr lang="en-US" altLang="zh-CN" dirty="0" smtClean="0"/>
+              <a:t>android</a:t>
+            </a:r>
+            <a:r>
+              <a:rPr lang="zh-CN" altLang="en-US" dirty="0" smtClean="0"/>
+              <a:t> </a:t>
+            </a:r>
+            <a:r>
+              <a:rPr lang="en-US" altLang="zh-CN" dirty="0" smtClean="0"/>
+              <a:t>platform</a:t>
+            </a:r>
+            <a:r>
+              <a:rPr lang="zh-CN" altLang="en-US" dirty="0" smtClean="0"/>
+              <a:t>能控制硬件，</a:t>
+            </a:r>
+            <a:r>
+              <a:rPr lang="en-US" altLang="zh-CN" dirty="0" smtClean="0"/>
+              <a:t>ODM</a:t>
+            </a:r>
+            <a:r>
+              <a:rPr lang="zh-CN" altLang="en-US" dirty="0" smtClean="0"/>
+              <a:t>需要自己写</a:t>
+            </a:r>
+            <a:r>
+              <a:rPr lang="en-US" altLang="zh-CN" smtClean="0"/>
+              <a:t>HAL</a:t>
+            </a:r>
+            <a:endParaRPr lang="en-US" altLang="zh-CN" dirty="0" smtClean="0"/>
+          </a:p>
+        </p:txBody>
+      </p:sp>
+    </p:spTree>
+    <p:extLst>
+      <p:ext uri="{BB962C8B-B14F-4D97-AF65-F5344CB8AC3E}">
+        <p14:creationId xmlns:p14="http://schemas.microsoft.com/office/powerpoint/2010/main" val="1162486692"/>
+      </p:ext>
+    </p:extLst>
+  </p:cSld>
+  <p:clrMapOvr>
+    <a:masterClrMapping/>
+  </p:clrMapOvr>
+</p:sld>
+</file>
+
 <file path=ppt/theme/theme1.xml><?xml version="1.0" encoding="utf-8"?>
 <a:theme xmlns:a="http://schemas.openxmlformats.org/drawingml/2006/main" name="Office Theme">
   <a:themeElements>
@@ -3594,7 +3958,7 @@
   <a:extraClrSchemeLst/>
   <a:extLst>
     <a:ext uri="{05A4C25C-085E-4340-85A3-A5531E510DB2}">
-      <thm15:themeFamily xmlns:thm15="http://schemas.microsoft.com/office/thememl/2012/main" xmlns="" name="Office Theme" id="{62F939B6-93AF-4DB8-9C6B-D6C7DFDC589F}" vid="{4A3C46E8-61CC-4603-A589-7422A47A8E4A}"/>
+      <thm15:themeFamily xmlns:thm15="http://schemas.microsoft.com/office/thememl/2012/main" name="Office Theme" id="{62F939B6-93AF-4DB8-9C6B-D6C7DFDC589F}" vid="{4A3C46E8-61CC-4603-A589-7422A47A8E4A}"/>
     </a:ext>
   </a:extLst>
 </a:theme>

</xml_diff>

<commit_message>
Add heapVS.stack, add meaning of O(logn) to temp
</commit_message>
<xml_diff>
--- a/temp.pptx
+++ b/temp.pptx
@@ -106,7 +106,7 @@
   </p:defaultTextStyle>
   <p:extLst>
     <p:ext uri="{EFAFB233-063F-42B5-8137-9DF3F51BA10A}">
-      <p15:sldGuideLst xmlns:p15="http://schemas.microsoft.com/office/powerpoint/2012/main">
+      <p15:sldGuideLst xmlns:p15="http://schemas.microsoft.com/office/powerpoint/2012/main" xmlns="">
         <p15:guide id="1" orient="horz" pos="2160">
           <p15:clr>
             <a:srgbClr val="A4A3A4"/>
@@ -149,7 +149,7 @@
           <p:cNvPr id="2" name="Title 1">
             <a:extLst>
               <a:ext uri="{FF2B5EF4-FFF2-40B4-BE49-F238E27FC236}">
-                <a16:creationId xmlns:a16="http://schemas.microsoft.com/office/drawing/2014/main" id="{B5F5F319-D979-4A3F-A4F8-4DDCDE891BFD}"/>
+                <a16:creationId xmlns:a16="http://schemas.microsoft.com/office/drawing/2014/main" xmlns="" id="{B5F5F319-D979-4A3F-A4F8-4DDCDE891BFD}"/>
               </a:ext>
             </a:extLst>
           </p:cNvPr>
@@ -186,7 +186,7 @@
           <p:cNvPr id="3" name="Subtitle 2">
             <a:extLst>
               <a:ext uri="{FF2B5EF4-FFF2-40B4-BE49-F238E27FC236}">
-                <a16:creationId xmlns:a16="http://schemas.microsoft.com/office/drawing/2014/main" id="{4474209B-F46B-471F-B216-60C5F4296C14}"/>
+                <a16:creationId xmlns:a16="http://schemas.microsoft.com/office/drawing/2014/main" xmlns="" id="{4474209B-F46B-471F-B216-60C5F4296C14}"/>
               </a:ext>
             </a:extLst>
           </p:cNvPr>
@@ -256,7 +256,7 @@
           <p:cNvPr id="4" name="Date Placeholder 3">
             <a:extLst>
               <a:ext uri="{FF2B5EF4-FFF2-40B4-BE49-F238E27FC236}">
-                <a16:creationId xmlns:a16="http://schemas.microsoft.com/office/drawing/2014/main" id="{1E6B3389-407A-410F-8F6D-D24D84CA4D6B}"/>
+                <a16:creationId xmlns:a16="http://schemas.microsoft.com/office/drawing/2014/main" xmlns="" id="{1E6B3389-407A-410F-8F6D-D24D84CA4D6B}"/>
               </a:ext>
             </a:extLst>
           </p:cNvPr>
@@ -274,7 +274,7 @@
           <a:p>
             <a:fld id="{E040DD28-DA01-4164-BF9D-AEC6AAD07A3E}" type="datetimeFigureOut">
               <a:rPr lang="en-US" smtClean="0"/>
-              <a:t>1/6/2018</a:t>
+              <a:t>1/23/2018</a:t>
             </a:fld>
             <a:endParaRPr lang="en-US"/>
           </a:p>
@@ -285,7 +285,7 @@
           <p:cNvPr id="5" name="Footer Placeholder 4">
             <a:extLst>
               <a:ext uri="{FF2B5EF4-FFF2-40B4-BE49-F238E27FC236}">
-                <a16:creationId xmlns:a16="http://schemas.microsoft.com/office/drawing/2014/main" id="{5D8C0812-771C-43AD-B38F-6BC2255600F9}"/>
+                <a16:creationId xmlns:a16="http://schemas.microsoft.com/office/drawing/2014/main" xmlns="" id="{5D8C0812-771C-43AD-B38F-6BC2255600F9}"/>
               </a:ext>
             </a:extLst>
           </p:cNvPr>
@@ -310,7 +310,7 @@
           <p:cNvPr id="6" name="Slide Number Placeholder 5">
             <a:extLst>
               <a:ext uri="{FF2B5EF4-FFF2-40B4-BE49-F238E27FC236}">
-                <a16:creationId xmlns:a16="http://schemas.microsoft.com/office/drawing/2014/main" id="{F39CB706-EA94-418D-9F2C-336E6EF264EC}"/>
+                <a16:creationId xmlns:a16="http://schemas.microsoft.com/office/drawing/2014/main" xmlns="" id="{F39CB706-EA94-418D-9F2C-336E6EF264EC}"/>
               </a:ext>
             </a:extLst>
           </p:cNvPr>
@@ -369,7 +369,7 @@
           <p:cNvPr id="2" name="Title 1">
             <a:extLst>
               <a:ext uri="{FF2B5EF4-FFF2-40B4-BE49-F238E27FC236}">
-                <a16:creationId xmlns:a16="http://schemas.microsoft.com/office/drawing/2014/main" id="{3A259477-0A53-4114-95B2-8A1D5D83E0A2}"/>
+                <a16:creationId xmlns:a16="http://schemas.microsoft.com/office/drawing/2014/main" xmlns="" id="{3A259477-0A53-4114-95B2-8A1D5D83E0A2}"/>
               </a:ext>
             </a:extLst>
           </p:cNvPr>
@@ -397,7 +397,7 @@
           <p:cNvPr id="3" name="Vertical Text Placeholder 2">
             <a:extLst>
               <a:ext uri="{FF2B5EF4-FFF2-40B4-BE49-F238E27FC236}">
-                <a16:creationId xmlns:a16="http://schemas.microsoft.com/office/drawing/2014/main" id="{533E45B0-73AC-4661-B286-CC8B49D0CBB1}"/>
+                <a16:creationId xmlns:a16="http://schemas.microsoft.com/office/drawing/2014/main" xmlns="" id="{533E45B0-73AC-4661-B286-CC8B49D0CBB1}"/>
               </a:ext>
             </a:extLst>
           </p:cNvPr>
@@ -454,7 +454,7 @@
           <p:cNvPr id="4" name="Date Placeholder 3">
             <a:extLst>
               <a:ext uri="{FF2B5EF4-FFF2-40B4-BE49-F238E27FC236}">
-                <a16:creationId xmlns:a16="http://schemas.microsoft.com/office/drawing/2014/main" id="{DDFFC868-093D-4D95-AA93-2203C226F89B}"/>
+                <a16:creationId xmlns:a16="http://schemas.microsoft.com/office/drawing/2014/main" xmlns="" id="{DDFFC868-093D-4D95-AA93-2203C226F89B}"/>
               </a:ext>
             </a:extLst>
           </p:cNvPr>
@@ -472,7 +472,7 @@
           <a:p>
             <a:fld id="{E040DD28-DA01-4164-BF9D-AEC6AAD07A3E}" type="datetimeFigureOut">
               <a:rPr lang="en-US" smtClean="0"/>
-              <a:t>1/6/2018</a:t>
+              <a:t>1/23/2018</a:t>
             </a:fld>
             <a:endParaRPr lang="en-US"/>
           </a:p>
@@ -483,7 +483,7 @@
           <p:cNvPr id="5" name="Footer Placeholder 4">
             <a:extLst>
               <a:ext uri="{FF2B5EF4-FFF2-40B4-BE49-F238E27FC236}">
-                <a16:creationId xmlns:a16="http://schemas.microsoft.com/office/drawing/2014/main" id="{CA068C37-6A3A-44A8-A7BE-58942241414E}"/>
+                <a16:creationId xmlns:a16="http://schemas.microsoft.com/office/drawing/2014/main" xmlns="" id="{CA068C37-6A3A-44A8-A7BE-58942241414E}"/>
               </a:ext>
             </a:extLst>
           </p:cNvPr>
@@ -508,7 +508,7 @@
           <p:cNvPr id="6" name="Slide Number Placeholder 5">
             <a:extLst>
               <a:ext uri="{FF2B5EF4-FFF2-40B4-BE49-F238E27FC236}">
-                <a16:creationId xmlns:a16="http://schemas.microsoft.com/office/drawing/2014/main" id="{E78B41CD-FF00-4C28-A410-5C2081075C8F}"/>
+                <a16:creationId xmlns:a16="http://schemas.microsoft.com/office/drawing/2014/main" xmlns="" id="{E78B41CD-FF00-4C28-A410-5C2081075C8F}"/>
               </a:ext>
             </a:extLst>
           </p:cNvPr>
@@ -567,7 +567,7 @@
           <p:cNvPr id="2" name="Vertical Title 1">
             <a:extLst>
               <a:ext uri="{FF2B5EF4-FFF2-40B4-BE49-F238E27FC236}">
-                <a16:creationId xmlns:a16="http://schemas.microsoft.com/office/drawing/2014/main" id="{09D8892F-E415-4A5B-8DE4-93BDA5F0BB5E}"/>
+                <a16:creationId xmlns:a16="http://schemas.microsoft.com/office/drawing/2014/main" xmlns="" id="{09D8892F-E415-4A5B-8DE4-93BDA5F0BB5E}"/>
               </a:ext>
             </a:extLst>
           </p:cNvPr>
@@ -600,7 +600,7 @@
           <p:cNvPr id="3" name="Vertical Text Placeholder 2">
             <a:extLst>
               <a:ext uri="{FF2B5EF4-FFF2-40B4-BE49-F238E27FC236}">
-                <a16:creationId xmlns:a16="http://schemas.microsoft.com/office/drawing/2014/main" id="{D914CE1D-36B4-41F6-8CAC-A824748DF349}"/>
+                <a16:creationId xmlns:a16="http://schemas.microsoft.com/office/drawing/2014/main" xmlns="" id="{D914CE1D-36B4-41F6-8CAC-A824748DF349}"/>
               </a:ext>
             </a:extLst>
           </p:cNvPr>
@@ -662,7 +662,7 @@
           <p:cNvPr id="4" name="Date Placeholder 3">
             <a:extLst>
               <a:ext uri="{FF2B5EF4-FFF2-40B4-BE49-F238E27FC236}">
-                <a16:creationId xmlns:a16="http://schemas.microsoft.com/office/drawing/2014/main" id="{09EBC416-5C2B-4705-88C6-697C7026E134}"/>
+                <a16:creationId xmlns:a16="http://schemas.microsoft.com/office/drawing/2014/main" xmlns="" id="{09EBC416-5C2B-4705-88C6-697C7026E134}"/>
               </a:ext>
             </a:extLst>
           </p:cNvPr>
@@ -680,7 +680,7 @@
           <a:p>
             <a:fld id="{E040DD28-DA01-4164-BF9D-AEC6AAD07A3E}" type="datetimeFigureOut">
               <a:rPr lang="en-US" smtClean="0"/>
-              <a:t>1/6/2018</a:t>
+              <a:t>1/23/2018</a:t>
             </a:fld>
             <a:endParaRPr lang="en-US"/>
           </a:p>
@@ -691,7 +691,7 @@
           <p:cNvPr id="5" name="Footer Placeholder 4">
             <a:extLst>
               <a:ext uri="{FF2B5EF4-FFF2-40B4-BE49-F238E27FC236}">
-                <a16:creationId xmlns:a16="http://schemas.microsoft.com/office/drawing/2014/main" id="{6A181D81-2CCF-4506-BAC8-332F27972DE7}"/>
+                <a16:creationId xmlns:a16="http://schemas.microsoft.com/office/drawing/2014/main" xmlns="" id="{6A181D81-2CCF-4506-BAC8-332F27972DE7}"/>
               </a:ext>
             </a:extLst>
           </p:cNvPr>
@@ -716,7 +716,7 @@
           <p:cNvPr id="6" name="Slide Number Placeholder 5">
             <a:extLst>
               <a:ext uri="{FF2B5EF4-FFF2-40B4-BE49-F238E27FC236}">
-                <a16:creationId xmlns:a16="http://schemas.microsoft.com/office/drawing/2014/main" id="{CF493655-0420-4B38-BA94-CAA81BE6B4A5}"/>
+                <a16:creationId xmlns:a16="http://schemas.microsoft.com/office/drawing/2014/main" xmlns="" id="{CF493655-0420-4B38-BA94-CAA81BE6B4A5}"/>
               </a:ext>
             </a:extLst>
           </p:cNvPr>
@@ -775,7 +775,7 @@
           <p:cNvPr id="2" name="Title 1">
             <a:extLst>
               <a:ext uri="{FF2B5EF4-FFF2-40B4-BE49-F238E27FC236}">
-                <a16:creationId xmlns:a16="http://schemas.microsoft.com/office/drawing/2014/main" id="{93BACEFF-B6D7-4BFD-B93D-95821BFD2D8F}"/>
+                <a16:creationId xmlns:a16="http://schemas.microsoft.com/office/drawing/2014/main" xmlns="" id="{93BACEFF-B6D7-4BFD-B93D-95821BFD2D8F}"/>
               </a:ext>
             </a:extLst>
           </p:cNvPr>
@@ -803,7 +803,7 @@
           <p:cNvPr id="3" name="Content Placeholder 2">
             <a:extLst>
               <a:ext uri="{FF2B5EF4-FFF2-40B4-BE49-F238E27FC236}">
-                <a16:creationId xmlns:a16="http://schemas.microsoft.com/office/drawing/2014/main" id="{59385ED6-5E0D-4E26-B486-3CC0C4291B3B}"/>
+                <a16:creationId xmlns:a16="http://schemas.microsoft.com/office/drawing/2014/main" xmlns="" id="{59385ED6-5E0D-4E26-B486-3CC0C4291B3B}"/>
               </a:ext>
             </a:extLst>
           </p:cNvPr>
@@ -860,7 +860,7 @@
           <p:cNvPr id="4" name="Date Placeholder 3">
             <a:extLst>
               <a:ext uri="{FF2B5EF4-FFF2-40B4-BE49-F238E27FC236}">
-                <a16:creationId xmlns:a16="http://schemas.microsoft.com/office/drawing/2014/main" id="{4FC036BA-799C-484E-9202-7D281BB13E19}"/>
+                <a16:creationId xmlns:a16="http://schemas.microsoft.com/office/drawing/2014/main" xmlns="" id="{4FC036BA-799C-484E-9202-7D281BB13E19}"/>
               </a:ext>
             </a:extLst>
           </p:cNvPr>
@@ -878,7 +878,7 @@
           <a:p>
             <a:fld id="{E040DD28-DA01-4164-BF9D-AEC6AAD07A3E}" type="datetimeFigureOut">
               <a:rPr lang="en-US" smtClean="0"/>
-              <a:t>1/6/2018</a:t>
+              <a:t>1/23/2018</a:t>
             </a:fld>
             <a:endParaRPr lang="en-US"/>
           </a:p>
@@ -889,7 +889,7 @@
           <p:cNvPr id="5" name="Footer Placeholder 4">
             <a:extLst>
               <a:ext uri="{FF2B5EF4-FFF2-40B4-BE49-F238E27FC236}">
-                <a16:creationId xmlns:a16="http://schemas.microsoft.com/office/drawing/2014/main" id="{84C705AF-ED38-4DC0-9CAD-82802278E609}"/>
+                <a16:creationId xmlns:a16="http://schemas.microsoft.com/office/drawing/2014/main" xmlns="" id="{84C705AF-ED38-4DC0-9CAD-82802278E609}"/>
               </a:ext>
             </a:extLst>
           </p:cNvPr>
@@ -914,7 +914,7 @@
           <p:cNvPr id="6" name="Slide Number Placeholder 5">
             <a:extLst>
               <a:ext uri="{FF2B5EF4-FFF2-40B4-BE49-F238E27FC236}">
-                <a16:creationId xmlns:a16="http://schemas.microsoft.com/office/drawing/2014/main" id="{FCAB4C5E-BC29-4DA3-8FDD-E88F20A62425}"/>
+                <a16:creationId xmlns:a16="http://schemas.microsoft.com/office/drawing/2014/main" xmlns="" id="{FCAB4C5E-BC29-4DA3-8FDD-E88F20A62425}"/>
               </a:ext>
             </a:extLst>
           </p:cNvPr>
@@ -973,7 +973,7 @@
           <p:cNvPr id="2" name="Title 1">
             <a:extLst>
               <a:ext uri="{FF2B5EF4-FFF2-40B4-BE49-F238E27FC236}">
-                <a16:creationId xmlns:a16="http://schemas.microsoft.com/office/drawing/2014/main" id="{56F4E2A8-3DB4-4F28-996A-ADBBE22EB9E6}"/>
+                <a16:creationId xmlns:a16="http://schemas.microsoft.com/office/drawing/2014/main" xmlns="" id="{56F4E2A8-3DB4-4F28-996A-ADBBE22EB9E6}"/>
               </a:ext>
             </a:extLst>
           </p:cNvPr>
@@ -1010,7 +1010,7 @@
           <p:cNvPr id="3" name="Text Placeholder 2">
             <a:extLst>
               <a:ext uri="{FF2B5EF4-FFF2-40B4-BE49-F238E27FC236}">
-                <a16:creationId xmlns:a16="http://schemas.microsoft.com/office/drawing/2014/main" id="{C89AE634-E835-4FB2-9543-9AE7D101C6F8}"/>
+                <a16:creationId xmlns:a16="http://schemas.microsoft.com/office/drawing/2014/main" xmlns="" id="{C89AE634-E835-4FB2-9543-9AE7D101C6F8}"/>
               </a:ext>
             </a:extLst>
           </p:cNvPr>
@@ -1135,7 +1135,7 @@
           <p:cNvPr id="4" name="Date Placeholder 3">
             <a:extLst>
               <a:ext uri="{FF2B5EF4-FFF2-40B4-BE49-F238E27FC236}">
-                <a16:creationId xmlns:a16="http://schemas.microsoft.com/office/drawing/2014/main" id="{A80E8D62-561D-425F-95E0-D8B490FEAFB0}"/>
+                <a16:creationId xmlns:a16="http://schemas.microsoft.com/office/drawing/2014/main" xmlns="" id="{A80E8D62-561D-425F-95E0-D8B490FEAFB0}"/>
               </a:ext>
             </a:extLst>
           </p:cNvPr>
@@ -1153,7 +1153,7 @@
           <a:p>
             <a:fld id="{E040DD28-DA01-4164-BF9D-AEC6AAD07A3E}" type="datetimeFigureOut">
               <a:rPr lang="en-US" smtClean="0"/>
-              <a:t>1/6/2018</a:t>
+              <a:t>1/23/2018</a:t>
             </a:fld>
             <a:endParaRPr lang="en-US"/>
           </a:p>
@@ -1164,7 +1164,7 @@
           <p:cNvPr id="5" name="Footer Placeholder 4">
             <a:extLst>
               <a:ext uri="{FF2B5EF4-FFF2-40B4-BE49-F238E27FC236}">
-                <a16:creationId xmlns:a16="http://schemas.microsoft.com/office/drawing/2014/main" id="{092BFE70-3129-4F21-A151-027B995D8283}"/>
+                <a16:creationId xmlns:a16="http://schemas.microsoft.com/office/drawing/2014/main" xmlns="" id="{092BFE70-3129-4F21-A151-027B995D8283}"/>
               </a:ext>
             </a:extLst>
           </p:cNvPr>
@@ -1189,7 +1189,7 @@
           <p:cNvPr id="6" name="Slide Number Placeholder 5">
             <a:extLst>
               <a:ext uri="{FF2B5EF4-FFF2-40B4-BE49-F238E27FC236}">
-                <a16:creationId xmlns:a16="http://schemas.microsoft.com/office/drawing/2014/main" id="{8021D42E-9379-4CA1-8E67-A8CFC2137736}"/>
+                <a16:creationId xmlns:a16="http://schemas.microsoft.com/office/drawing/2014/main" xmlns="" id="{8021D42E-9379-4CA1-8E67-A8CFC2137736}"/>
               </a:ext>
             </a:extLst>
           </p:cNvPr>
@@ -1248,7 +1248,7 @@
           <p:cNvPr id="2" name="Title 1">
             <a:extLst>
               <a:ext uri="{FF2B5EF4-FFF2-40B4-BE49-F238E27FC236}">
-                <a16:creationId xmlns:a16="http://schemas.microsoft.com/office/drawing/2014/main" id="{6E79E456-1075-4906-82F7-0E6109B9E35D}"/>
+                <a16:creationId xmlns:a16="http://schemas.microsoft.com/office/drawing/2014/main" xmlns="" id="{6E79E456-1075-4906-82F7-0E6109B9E35D}"/>
               </a:ext>
             </a:extLst>
           </p:cNvPr>
@@ -1276,7 +1276,7 @@
           <p:cNvPr id="3" name="Content Placeholder 2">
             <a:extLst>
               <a:ext uri="{FF2B5EF4-FFF2-40B4-BE49-F238E27FC236}">
-                <a16:creationId xmlns:a16="http://schemas.microsoft.com/office/drawing/2014/main" id="{5B119237-D568-4846-9810-EE66DFA84982}"/>
+                <a16:creationId xmlns:a16="http://schemas.microsoft.com/office/drawing/2014/main" xmlns="" id="{5B119237-D568-4846-9810-EE66DFA84982}"/>
               </a:ext>
             </a:extLst>
           </p:cNvPr>
@@ -1338,7 +1338,7 @@
           <p:cNvPr id="4" name="Content Placeholder 3">
             <a:extLst>
               <a:ext uri="{FF2B5EF4-FFF2-40B4-BE49-F238E27FC236}">
-                <a16:creationId xmlns:a16="http://schemas.microsoft.com/office/drawing/2014/main" id="{B4C29F7A-057C-4495-9330-75B170FD1A8C}"/>
+                <a16:creationId xmlns:a16="http://schemas.microsoft.com/office/drawing/2014/main" xmlns="" id="{B4C29F7A-057C-4495-9330-75B170FD1A8C}"/>
               </a:ext>
             </a:extLst>
           </p:cNvPr>
@@ -1400,7 +1400,7 @@
           <p:cNvPr id="5" name="Date Placeholder 4">
             <a:extLst>
               <a:ext uri="{FF2B5EF4-FFF2-40B4-BE49-F238E27FC236}">
-                <a16:creationId xmlns:a16="http://schemas.microsoft.com/office/drawing/2014/main" id="{6B9731BB-E5EB-4386-A8C4-02BCBE618022}"/>
+                <a16:creationId xmlns:a16="http://schemas.microsoft.com/office/drawing/2014/main" xmlns="" id="{6B9731BB-E5EB-4386-A8C4-02BCBE618022}"/>
               </a:ext>
             </a:extLst>
           </p:cNvPr>
@@ -1418,7 +1418,7 @@
           <a:p>
             <a:fld id="{E040DD28-DA01-4164-BF9D-AEC6AAD07A3E}" type="datetimeFigureOut">
               <a:rPr lang="en-US" smtClean="0"/>
-              <a:t>1/6/2018</a:t>
+              <a:t>1/23/2018</a:t>
             </a:fld>
             <a:endParaRPr lang="en-US"/>
           </a:p>
@@ -1429,7 +1429,7 @@
           <p:cNvPr id="6" name="Footer Placeholder 5">
             <a:extLst>
               <a:ext uri="{FF2B5EF4-FFF2-40B4-BE49-F238E27FC236}">
-                <a16:creationId xmlns:a16="http://schemas.microsoft.com/office/drawing/2014/main" id="{D61D5281-CDA5-43EF-BE1C-79A1529A08DB}"/>
+                <a16:creationId xmlns:a16="http://schemas.microsoft.com/office/drawing/2014/main" xmlns="" id="{D61D5281-CDA5-43EF-BE1C-79A1529A08DB}"/>
               </a:ext>
             </a:extLst>
           </p:cNvPr>
@@ -1454,7 +1454,7 @@
           <p:cNvPr id="7" name="Slide Number Placeholder 6">
             <a:extLst>
               <a:ext uri="{FF2B5EF4-FFF2-40B4-BE49-F238E27FC236}">
-                <a16:creationId xmlns:a16="http://schemas.microsoft.com/office/drawing/2014/main" id="{39B30A33-21E5-4395-AB23-BAC1B5A92289}"/>
+                <a16:creationId xmlns:a16="http://schemas.microsoft.com/office/drawing/2014/main" xmlns="" id="{39B30A33-21E5-4395-AB23-BAC1B5A92289}"/>
               </a:ext>
             </a:extLst>
           </p:cNvPr>
@@ -1513,7 +1513,7 @@
           <p:cNvPr id="2" name="Title 1">
             <a:extLst>
               <a:ext uri="{FF2B5EF4-FFF2-40B4-BE49-F238E27FC236}">
-                <a16:creationId xmlns:a16="http://schemas.microsoft.com/office/drawing/2014/main" id="{37B4C097-07A2-4984-A86D-7F052CFF4886}"/>
+                <a16:creationId xmlns:a16="http://schemas.microsoft.com/office/drawing/2014/main" xmlns="" id="{37B4C097-07A2-4984-A86D-7F052CFF4886}"/>
               </a:ext>
             </a:extLst>
           </p:cNvPr>
@@ -1546,7 +1546,7 @@
           <p:cNvPr id="3" name="Text Placeholder 2">
             <a:extLst>
               <a:ext uri="{FF2B5EF4-FFF2-40B4-BE49-F238E27FC236}">
-                <a16:creationId xmlns:a16="http://schemas.microsoft.com/office/drawing/2014/main" id="{586C90C0-904E-436B-996B-03DD09FE05C4}"/>
+                <a16:creationId xmlns:a16="http://schemas.microsoft.com/office/drawing/2014/main" xmlns="" id="{586C90C0-904E-436B-996B-03DD09FE05C4}"/>
               </a:ext>
             </a:extLst>
           </p:cNvPr>
@@ -1617,7 +1617,7 @@
           <p:cNvPr id="4" name="Content Placeholder 3">
             <a:extLst>
               <a:ext uri="{FF2B5EF4-FFF2-40B4-BE49-F238E27FC236}">
-                <a16:creationId xmlns:a16="http://schemas.microsoft.com/office/drawing/2014/main" id="{E03CBD82-3AD3-4E06-90BB-01B87FA81FC7}"/>
+                <a16:creationId xmlns:a16="http://schemas.microsoft.com/office/drawing/2014/main" xmlns="" id="{E03CBD82-3AD3-4E06-90BB-01B87FA81FC7}"/>
               </a:ext>
             </a:extLst>
           </p:cNvPr>
@@ -1679,7 +1679,7 @@
           <p:cNvPr id="5" name="Text Placeholder 4">
             <a:extLst>
               <a:ext uri="{FF2B5EF4-FFF2-40B4-BE49-F238E27FC236}">
-                <a16:creationId xmlns:a16="http://schemas.microsoft.com/office/drawing/2014/main" id="{04ACE262-BFED-4131-A5BA-E0278B00A663}"/>
+                <a16:creationId xmlns:a16="http://schemas.microsoft.com/office/drawing/2014/main" xmlns="" id="{04ACE262-BFED-4131-A5BA-E0278B00A663}"/>
               </a:ext>
             </a:extLst>
           </p:cNvPr>
@@ -1750,7 +1750,7 @@
           <p:cNvPr id="6" name="Content Placeholder 5">
             <a:extLst>
               <a:ext uri="{FF2B5EF4-FFF2-40B4-BE49-F238E27FC236}">
-                <a16:creationId xmlns:a16="http://schemas.microsoft.com/office/drawing/2014/main" id="{1BC543A8-1DAB-4F64-93C3-0EB766AE86F9}"/>
+                <a16:creationId xmlns:a16="http://schemas.microsoft.com/office/drawing/2014/main" xmlns="" id="{1BC543A8-1DAB-4F64-93C3-0EB766AE86F9}"/>
               </a:ext>
             </a:extLst>
           </p:cNvPr>
@@ -1812,7 +1812,7 @@
           <p:cNvPr id="7" name="Date Placeholder 6">
             <a:extLst>
               <a:ext uri="{FF2B5EF4-FFF2-40B4-BE49-F238E27FC236}">
-                <a16:creationId xmlns:a16="http://schemas.microsoft.com/office/drawing/2014/main" id="{DBF0794B-2DF7-43D8-8A0C-752A3C841A95}"/>
+                <a16:creationId xmlns:a16="http://schemas.microsoft.com/office/drawing/2014/main" xmlns="" id="{DBF0794B-2DF7-43D8-8A0C-752A3C841A95}"/>
               </a:ext>
             </a:extLst>
           </p:cNvPr>
@@ -1830,7 +1830,7 @@
           <a:p>
             <a:fld id="{E040DD28-DA01-4164-BF9D-AEC6AAD07A3E}" type="datetimeFigureOut">
               <a:rPr lang="en-US" smtClean="0"/>
-              <a:t>1/6/2018</a:t>
+              <a:t>1/23/2018</a:t>
             </a:fld>
             <a:endParaRPr lang="en-US"/>
           </a:p>
@@ -1841,7 +1841,7 @@
           <p:cNvPr id="8" name="Footer Placeholder 7">
             <a:extLst>
               <a:ext uri="{FF2B5EF4-FFF2-40B4-BE49-F238E27FC236}">
-                <a16:creationId xmlns:a16="http://schemas.microsoft.com/office/drawing/2014/main" id="{15BFDF4B-45AB-4776-B148-1F4FA0BCD9A6}"/>
+                <a16:creationId xmlns:a16="http://schemas.microsoft.com/office/drawing/2014/main" xmlns="" id="{15BFDF4B-45AB-4776-B148-1F4FA0BCD9A6}"/>
               </a:ext>
             </a:extLst>
           </p:cNvPr>
@@ -1866,7 +1866,7 @@
           <p:cNvPr id="9" name="Slide Number Placeholder 8">
             <a:extLst>
               <a:ext uri="{FF2B5EF4-FFF2-40B4-BE49-F238E27FC236}">
-                <a16:creationId xmlns:a16="http://schemas.microsoft.com/office/drawing/2014/main" id="{74ACFCD8-1AA0-4174-A68D-6293F9717D99}"/>
+                <a16:creationId xmlns:a16="http://schemas.microsoft.com/office/drawing/2014/main" xmlns="" id="{74ACFCD8-1AA0-4174-A68D-6293F9717D99}"/>
               </a:ext>
             </a:extLst>
           </p:cNvPr>
@@ -1925,7 +1925,7 @@
           <p:cNvPr id="2" name="Title 1">
             <a:extLst>
               <a:ext uri="{FF2B5EF4-FFF2-40B4-BE49-F238E27FC236}">
-                <a16:creationId xmlns:a16="http://schemas.microsoft.com/office/drawing/2014/main" id="{A9F3CBAC-2073-439B-B8DE-FB80422902CE}"/>
+                <a16:creationId xmlns:a16="http://schemas.microsoft.com/office/drawing/2014/main" xmlns="" id="{A9F3CBAC-2073-439B-B8DE-FB80422902CE}"/>
               </a:ext>
             </a:extLst>
           </p:cNvPr>
@@ -1953,7 +1953,7 @@
           <p:cNvPr id="3" name="Date Placeholder 2">
             <a:extLst>
               <a:ext uri="{FF2B5EF4-FFF2-40B4-BE49-F238E27FC236}">
-                <a16:creationId xmlns:a16="http://schemas.microsoft.com/office/drawing/2014/main" id="{06A84D4C-CD47-42D3-8505-872676C28963}"/>
+                <a16:creationId xmlns:a16="http://schemas.microsoft.com/office/drawing/2014/main" xmlns="" id="{06A84D4C-CD47-42D3-8505-872676C28963}"/>
               </a:ext>
             </a:extLst>
           </p:cNvPr>
@@ -1971,7 +1971,7 @@
           <a:p>
             <a:fld id="{E040DD28-DA01-4164-BF9D-AEC6AAD07A3E}" type="datetimeFigureOut">
               <a:rPr lang="en-US" smtClean="0"/>
-              <a:t>1/6/2018</a:t>
+              <a:t>1/23/2018</a:t>
             </a:fld>
             <a:endParaRPr lang="en-US"/>
           </a:p>
@@ -1982,7 +1982,7 @@
           <p:cNvPr id="4" name="Footer Placeholder 3">
             <a:extLst>
               <a:ext uri="{FF2B5EF4-FFF2-40B4-BE49-F238E27FC236}">
-                <a16:creationId xmlns:a16="http://schemas.microsoft.com/office/drawing/2014/main" id="{B784711A-B8EA-4963-A653-27EE2997119F}"/>
+                <a16:creationId xmlns:a16="http://schemas.microsoft.com/office/drawing/2014/main" xmlns="" id="{B784711A-B8EA-4963-A653-27EE2997119F}"/>
               </a:ext>
             </a:extLst>
           </p:cNvPr>
@@ -2007,7 +2007,7 @@
           <p:cNvPr id="5" name="Slide Number Placeholder 4">
             <a:extLst>
               <a:ext uri="{FF2B5EF4-FFF2-40B4-BE49-F238E27FC236}">
-                <a16:creationId xmlns:a16="http://schemas.microsoft.com/office/drawing/2014/main" id="{9BD0276A-CA50-4B27-9DF4-12C17991F3AD}"/>
+                <a16:creationId xmlns:a16="http://schemas.microsoft.com/office/drawing/2014/main" xmlns="" id="{9BD0276A-CA50-4B27-9DF4-12C17991F3AD}"/>
               </a:ext>
             </a:extLst>
           </p:cNvPr>
@@ -2066,7 +2066,7 @@
           <p:cNvPr id="2" name="Date Placeholder 1">
             <a:extLst>
               <a:ext uri="{FF2B5EF4-FFF2-40B4-BE49-F238E27FC236}">
-                <a16:creationId xmlns:a16="http://schemas.microsoft.com/office/drawing/2014/main" id="{CBE24604-C75B-4F9D-8382-AC380D5DD668}"/>
+                <a16:creationId xmlns:a16="http://schemas.microsoft.com/office/drawing/2014/main" xmlns="" id="{CBE24604-C75B-4F9D-8382-AC380D5DD668}"/>
               </a:ext>
             </a:extLst>
           </p:cNvPr>
@@ -2084,7 +2084,7 @@
           <a:p>
             <a:fld id="{E040DD28-DA01-4164-BF9D-AEC6AAD07A3E}" type="datetimeFigureOut">
               <a:rPr lang="en-US" smtClean="0"/>
-              <a:t>1/6/2018</a:t>
+              <a:t>1/23/2018</a:t>
             </a:fld>
             <a:endParaRPr lang="en-US"/>
           </a:p>
@@ -2095,7 +2095,7 @@
           <p:cNvPr id="3" name="Footer Placeholder 2">
             <a:extLst>
               <a:ext uri="{FF2B5EF4-FFF2-40B4-BE49-F238E27FC236}">
-                <a16:creationId xmlns:a16="http://schemas.microsoft.com/office/drawing/2014/main" id="{2641AA10-AE31-466F-96AF-31A1A0955AD1}"/>
+                <a16:creationId xmlns:a16="http://schemas.microsoft.com/office/drawing/2014/main" xmlns="" id="{2641AA10-AE31-466F-96AF-31A1A0955AD1}"/>
               </a:ext>
             </a:extLst>
           </p:cNvPr>
@@ -2120,7 +2120,7 @@
           <p:cNvPr id="4" name="Slide Number Placeholder 3">
             <a:extLst>
               <a:ext uri="{FF2B5EF4-FFF2-40B4-BE49-F238E27FC236}">
-                <a16:creationId xmlns:a16="http://schemas.microsoft.com/office/drawing/2014/main" id="{756609DE-ABCC-4735-9687-532D469DC4E2}"/>
+                <a16:creationId xmlns:a16="http://schemas.microsoft.com/office/drawing/2014/main" xmlns="" id="{756609DE-ABCC-4735-9687-532D469DC4E2}"/>
               </a:ext>
             </a:extLst>
           </p:cNvPr>
@@ -2179,7 +2179,7 @@
           <p:cNvPr id="2" name="Title 1">
             <a:extLst>
               <a:ext uri="{FF2B5EF4-FFF2-40B4-BE49-F238E27FC236}">
-                <a16:creationId xmlns:a16="http://schemas.microsoft.com/office/drawing/2014/main" id="{70B034F0-2116-43B6-A3DF-533AE5CE39CE}"/>
+                <a16:creationId xmlns:a16="http://schemas.microsoft.com/office/drawing/2014/main" xmlns="" id="{70B034F0-2116-43B6-A3DF-533AE5CE39CE}"/>
               </a:ext>
             </a:extLst>
           </p:cNvPr>
@@ -2216,7 +2216,7 @@
           <p:cNvPr id="3" name="Content Placeholder 2">
             <a:extLst>
               <a:ext uri="{FF2B5EF4-FFF2-40B4-BE49-F238E27FC236}">
-                <a16:creationId xmlns:a16="http://schemas.microsoft.com/office/drawing/2014/main" id="{5B8FA73E-8222-4BD6-84B5-93652E6DEF4C}"/>
+                <a16:creationId xmlns:a16="http://schemas.microsoft.com/office/drawing/2014/main" xmlns="" id="{5B8FA73E-8222-4BD6-84B5-93652E6DEF4C}"/>
               </a:ext>
             </a:extLst>
           </p:cNvPr>
@@ -2306,7 +2306,7 @@
           <p:cNvPr id="4" name="Text Placeholder 3">
             <a:extLst>
               <a:ext uri="{FF2B5EF4-FFF2-40B4-BE49-F238E27FC236}">
-                <a16:creationId xmlns:a16="http://schemas.microsoft.com/office/drawing/2014/main" id="{070680AD-0DF4-407C-815A-B6FC0B7A7F1E}"/>
+                <a16:creationId xmlns:a16="http://schemas.microsoft.com/office/drawing/2014/main" xmlns="" id="{070680AD-0DF4-407C-815A-B6FC0B7A7F1E}"/>
               </a:ext>
             </a:extLst>
           </p:cNvPr>
@@ -2377,7 +2377,7 @@
           <p:cNvPr id="5" name="Date Placeholder 4">
             <a:extLst>
               <a:ext uri="{FF2B5EF4-FFF2-40B4-BE49-F238E27FC236}">
-                <a16:creationId xmlns:a16="http://schemas.microsoft.com/office/drawing/2014/main" id="{D828C134-AC88-45CD-8C31-4BAB0E6B3390}"/>
+                <a16:creationId xmlns:a16="http://schemas.microsoft.com/office/drawing/2014/main" xmlns="" id="{D828C134-AC88-45CD-8C31-4BAB0E6B3390}"/>
               </a:ext>
             </a:extLst>
           </p:cNvPr>
@@ -2395,7 +2395,7 @@
           <a:p>
             <a:fld id="{E040DD28-DA01-4164-BF9D-AEC6AAD07A3E}" type="datetimeFigureOut">
               <a:rPr lang="en-US" smtClean="0"/>
-              <a:t>1/6/2018</a:t>
+              <a:t>1/23/2018</a:t>
             </a:fld>
             <a:endParaRPr lang="en-US"/>
           </a:p>
@@ -2406,7 +2406,7 @@
           <p:cNvPr id="6" name="Footer Placeholder 5">
             <a:extLst>
               <a:ext uri="{FF2B5EF4-FFF2-40B4-BE49-F238E27FC236}">
-                <a16:creationId xmlns:a16="http://schemas.microsoft.com/office/drawing/2014/main" id="{A6BCAE05-6F4C-44B9-A59A-E9435FAE141A}"/>
+                <a16:creationId xmlns:a16="http://schemas.microsoft.com/office/drawing/2014/main" xmlns="" id="{A6BCAE05-6F4C-44B9-A59A-E9435FAE141A}"/>
               </a:ext>
             </a:extLst>
           </p:cNvPr>
@@ -2431,7 +2431,7 @@
           <p:cNvPr id="7" name="Slide Number Placeholder 6">
             <a:extLst>
               <a:ext uri="{FF2B5EF4-FFF2-40B4-BE49-F238E27FC236}">
-                <a16:creationId xmlns:a16="http://schemas.microsoft.com/office/drawing/2014/main" id="{F3033C98-CC7D-4B89-8DEA-9E1C9B62C714}"/>
+                <a16:creationId xmlns:a16="http://schemas.microsoft.com/office/drawing/2014/main" xmlns="" id="{F3033C98-CC7D-4B89-8DEA-9E1C9B62C714}"/>
               </a:ext>
             </a:extLst>
           </p:cNvPr>
@@ -2490,7 +2490,7 @@
           <p:cNvPr id="2" name="Title 1">
             <a:extLst>
               <a:ext uri="{FF2B5EF4-FFF2-40B4-BE49-F238E27FC236}">
-                <a16:creationId xmlns:a16="http://schemas.microsoft.com/office/drawing/2014/main" id="{C5C61AB1-B345-446E-A14A-919A9FE596A9}"/>
+                <a16:creationId xmlns:a16="http://schemas.microsoft.com/office/drawing/2014/main" xmlns="" id="{C5C61AB1-B345-446E-A14A-919A9FE596A9}"/>
               </a:ext>
             </a:extLst>
           </p:cNvPr>
@@ -2527,7 +2527,7 @@
           <p:cNvPr id="3" name="Picture Placeholder 2">
             <a:extLst>
               <a:ext uri="{FF2B5EF4-FFF2-40B4-BE49-F238E27FC236}">
-                <a16:creationId xmlns:a16="http://schemas.microsoft.com/office/drawing/2014/main" id="{C8FC6971-C8D3-41FA-9E59-9267B41B86D7}"/>
+                <a16:creationId xmlns:a16="http://schemas.microsoft.com/office/drawing/2014/main" xmlns="" id="{C8FC6971-C8D3-41FA-9E59-9267B41B86D7}"/>
               </a:ext>
             </a:extLst>
           </p:cNvPr>
@@ -2594,7 +2594,7 @@
           <p:cNvPr id="4" name="Text Placeholder 3">
             <a:extLst>
               <a:ext uri="{FF2B5EF4-FFF2-40B4-BE49-F238E27FC236}">
-                <a16:creationId xmlns:a16="http://schemas.microsoft.com/office/drawing/2014/main" id="{6D3E27C0-ECF1-4974-89DC-5E5F1753643D}"/>
+                <a16:creationId xmlns:a16="http://schemas.microsoft.com/office/drawing/2014/main" xmlns="" id="{6D3E27C0-ECF1-4974-89DC-5E5F1753643D}"/>
               </a:ext>
             </a:extLst>
           </p:cNvPr>
@@ -2665,7 +2665,7 @@
           <p:cNvPr id="5" name="Date Placeholder 4">
             <a:extLst>
               <a:ext uri="{FF2B5EF4-FFF2-40B4-BE49-F238E27FC236}">
-                <a16:creationId xmlns:a16="http://schemas.microsoft.com/office/drawing/2014/main" id="{EB0CF908-7B88-457C-A7CB-BA8E59EFE6B1}"/>
+                <a16:creationId xmlns:a16="http://schemas.microsoft.com/office/drawing/2014/main" xmlns="" id="{EB0CF908-7B88-457C-A7CB-BA8E59EFE6B1}"/>
               </a:ext>
             </a:extLst>
           </p:cNvPr>
@@ -2683,7 +2683,7 @@
           <a:p>
             <a:fld id="{E040DD28-DA01-4164-BF9D-AEC6AAD07A3E}" type="datetimeFigureOut">
               <a:rPr lang="en-US" smtClean="0"/>
-              <a:t>1/6/2018</a:t>
+              <a:t>1/23/2018</a:t>
             </a:fld>
             <a:endParaRPr lang="en-US"/>
           </a:p>
@@ -2694,7 +2694,7 @@
           <p:cNvPr id="6" name="Footer Placeholder 5">
             <a:extLst>
               <a:ext uri="{FF2B5EF4-FFF2-40B4-BE49-F238E27FC236}">
-                <a16:creationId xmlns:a16="http://schemas.microsoft.com/office/drawing/2014/main" id="{9EFEFD02-5829-4D99-8387-FA6DDA7FDCE6}"/>
+                <a16:creationId xmlns:a16="http://schemas.microsoft.com/office/drawing/2014/main" xmlns="" id="{9EFEFD02-5829-4D99-8387-FA6DDA7FDCE6}"/>
               </a:ext>
             </a:extLst>
           </p:cNvPr>
@@ -2719,7 +2719,7 @@
           <p:cNvPr id="7" name="Slide Number Placeholder 6">
             <a:extLst>
               <a:ext uri="{FF2B5EF4-FFF2-40B4-BE49-F238E27FC236}">
-                <a16:creationId xmlns:a16="http://schemas.microsoft.com/office/drawing/2014/main" id="{CC83D447-B6BD-4EB6-84FA-277F982BD485}"/>
+                <a16:creationId xmlns:a16="http://schemas.microsoft.com/office/drawing/2014/main" xmlns="" id="{CC83D447-B6BD-4EB6-84FA-277F982BD485}"/>
               </a:ext>
             </a:extLst>
           </p:cNvPr>
@@ -2783,7 +2783,7 @@
           <p:cNvPr id="2" name="Title Placeholder 1">
             <a:extLst>
               <a:ext uri="{FF2B5EF4-FFF2-40B4-BE49-F238E27FC236}">
-                <a16:creationId xmlns:a16="http://schemas.microsoft.com/office/drawing/2014/main" id="{BF4BEE1F-B564-43B7-B55B-42176FDCF6A5}"/>
+                <a16:creationId xmlns:a16="http://schemas.microsoft.com/office/drawing/2014/main" xmlns="" id="{BF4BEE1F-B564-43B7-B55B-42176FDCF6A5}"/>
               </a:ext>
             </a:extLst>
           </p:cNvPr>
@@ -2821,7 +2821,7 @@
           <p:cNvPr id="3" name="Text Placeholder 2">
             <a:extLst>
               <a:ext uri="{FF2B5EF4-FFF2-40B4-BE49-F238E27FC236}">
-                <a16:creationId xmlns:a16="http://schemas.microsoft.com/office/drawing/2014/main" id="{C280B79D-E421-4AC8-A9C2-4B56DA344FB6}"/>
+                <a16:creationId xmlns:a16="http://schemas.microsoft.com/office/drawing/2014/main" xmlns="" id="{C280B79D-E421-4AC8-A9C2-4B56DA344FB6}"/>
               </a:ext>
             </a:extLst>
           </p:cNvPr>
@@ -2888,7 +2888,7 @@
           <p:cNvPr id="4" name="Date Placeholder 3">
             <a:extLst>
               <a:ext uri="{FF2B5EF4-FFF2-40B4-BE49-F238E27FC236}">
-                <a16:creationId xmlns:a16="http://schemas.microsoft.com/office/drawing/2014/main" id="{5805F7AC-3768-4B7D-A30D-D8CB381EF3DC}"/>
+                <a16:creationId xmlns:a16="http://schemas.microsoft.com/office/drawing/2014/main" xmlns="" id="{5805F7AC-3768-4B7D-A30D-D8CB381EF3DC}"/>
               </a:ext>
             </a:extLst>
           </p:cNvPr>
@@ -2924,7 +2924,7 @@
           <a:p>
             <a:fld id="{E040DD28-DA01-4164-BF9D-AEC6AAD07A3E}" type="datetimeFigureOut">
               <a:rPr lang="en-US" smtClean="0"/>
-              <a:t>1/6/2018</a:t>
+              <a:t>1/23/2018</a:t>
             </a:fld>
             <a:endParaRPr lang="en-US"/>
           </a:p>
@@ -2935,7 +2935,7 @@
           <p:cNvPr id="5" name="Footer Placeholder 4">
             <a:extLst>
               <a:ext uri="{FF2B5EF4-FFF2-40B4-BE49-F238E27FC236}">
-                <a16:creationId xmlns:a16="http://schemas.microsoft.com/office/drawing/2014/main" id="{1F22F8AA-82E2-4EE1-A481-8556E12EA635}"/>
+                <a16:creationId xmlns:a16="http://schemas.microsoft.com/office/drawing/2014/main" xmlns="" id="{1F22F8AA-82E2-4EE1-A481-8556E12EA635}"/>
               </a:ext>
             </a:extLst>
           </p:cNvPr>
@@ -2978,7 +2978,7 @@
           <p:cNvPr id="6" name="Slide Number Placeholder 5">
             <a:extLst>
               <a:ext uri="{FF2B5EF4-FFF2-40B4-BE49-F238E27FC236}">
-                <a16:creationId xmlns:a16="http://schemas.microsoft.com/office/drawing/2014/main" id="{AEDE27F2-C1D2-4B19-8C04-6B34AC016DA7}"/>
+                <a16:creationId xmlns:a16="http://schemas.microsoft.com/office/drawing/2014/main" xmlns="" id="{AEDE27F2-C1D2-4B19-8C04-6B34AC016DA7}"/>
               </a:ext>
             </a:extLst>
           </p:cNvPr>
@@ -3341,6 +3341,158 @@
           <a:chExt cx="0" cy="0"/>
         </a:xfrm>
       </p:grpSpPr>
+      <p:sp>
+        <p:nvSpPr>
+          <p:cNvPr id="2" name="テキスト ボックス 1"/>
+          <p:cNvSpPr txBox="1"/>
+          <p:nvPr/>
+        </p:nvSpPr>
+        <p:spPr>
+          <a:xfrm>
+            <a:off x="1" y="143123"/>
+            <a:ext cx="12192000" cy="1477328"/>
+          </a:xfrm>
+          <a:prstGeom prst="rect">
+            <a:avLst/>
+          </a:prstGeom>
+          <a:noFill/>
+        </p:spPr>
+        <p:txBody>
+          <a:bodyPr wrap="square" rtlCol="0">
+            <a:spAutoFit/>
+          </a:bodyPr>
+          <a:lstStyle/>
+          <a:p>
+            <a:r>
+              <a:rPr kumimoji="1" lang="en-US" altLang="ja-JP" dirty="0" smtClean="0"/>
+              <a:t>What is means by having </a:t>
+            </a:r>
+            <a:r>
+              <a:rPr kumimoji="1" lang="en-US" altLang="ja-JP" b="1" dirty="0" smtClean="0">
+                <a:solidFill>
+                  <a:srgbClr val="FF0000"/>
+                </a:solidFill>
+              </a:rPr>
+              <a:t>O(</a:t>
+            </a:r>
+            <a:r>
+              <a:rPr kumimoji="1" lang="en-US" altLang="ja-JP" b="1" dirty="0" err="1" smtClean="0">
+                <a:solidFill>
+                  <a:srgbClr val="FF0000"/>
+                </a:solidFill>
+              </a:rPr>
+              <a:t>logn</a:t>
+            </a:r>
+            <a:r>
+              <a:rPr kumimoji="1" lang="en-US" altLang="ja-JP" b="1" dirty="0" smtClean="0">
+                <a:solidFill>
+                  <a:srgbClr val="FF0000"/>
+                </a:solidFill>
+              </a:rPr>
+              <a:t>)</a:t>
+            </a:r>
+            <a:r>
+              <a:rPr kumimoji="1" lang="en-US" altLang="ja-JP" dirty="0" smtClean="0"/>
+              <a:t> time complexity?</a:t>
+            </a:r>
+          </a:p>
+          <a:p>
+            <a:pPr marL="285750" indent="-285750">
+              <a:buFont typeface="Arial" panose="020B0604020202020204" pitchFamily="34" charset="0"/>
+              <a:buChar char="•"/>
+            </a:pPr>
+            <a:r>
+              <a:rPr lang="en-US" altLang="ja-JP" dirty="0"/>
+              <a:t>(</a:t>
+            </a:r>
+            <a:r>
+              <a:rPr lang="en-US" altLang="ja-JP" dirty="0"/>
+              <a:t>O(log n)</a:t>
+            </a:r>
+            <a:r>
+              <a:rPr lang="en-US" altLang="ja-JP" dirty="0"/>
+              <a:t>) essentially means that the running time grows in proportion to the </a:t>
+            </a:r>
+            <a:r>
+              <a:rPr lang="en-US" altLang="ja-JP" i="1" dirty="0"/>
+              <a:t>logarithm</a:t>
+            </a:r>
+            <a:r>
+              <a:rPr lang="en-US" altLang="ja-JP" dirty="0"/>
+              <a:t> of the input size - as an example, if 10 items takes at most some amount of time </a:t>
+            </a:r>
+            <a:r>
+              <a:rPr lang="en-US" altLang="ja-JP" dirty="0"/>
+              <a:t>x</a:t>
+            </a:r>
+            <a:r>
+              <a:rPr lang="en-US" altLang="ja-JP" dirty="0"/>
+              <a:t>, and </a:t>
+            </a:r>
+            <a:r>
+              <a:rPr lang="en-US" altLang="ja-JP" b="1" dirty="0"/>
+              <a:t>100</a:t>
+            </a:r>
+            <a:r>
+              <a:rPr lang="en-US" altLang="ja-JP" dirty="0"/>
+              <a:t> items takes at most, say, </a:t>
+            </a:r>
+            <a:r>
+              <a:rPr lang="en-US" altLang="ja-JP" b="1" dirty="0"/>
+              <a:t>2x</a:t>
+            </a:r>
+            <a:r>
+              <a:rPr lang="en-US" altLang="ja-JP" dirty="0"/>
+              <a:t>, and </a:t>
+            </a:r>
+            <a:r>
+              <a:rPr lang="en-US" altLang="ja-JP" b="1" dirty="0" smtClean="0"/>
+              <a:t>10,000 </a:t>
+            </a:r>
+            <a:r>
+              <a:rPr lang="en-US" altLang="ja-JP" dirty="0" smtClean="0"/>
+              <a:t>items </a:t>
+            </a:r>
+            <a:r>
+              <a:rPr lang="en-US" altLang="ja-JP" dirty="0"/>
+              <a:t>takes at most </a:t>
+            </a:r>
+            <a:r>
+              <a:rPr lang="en-US" altLang="ja-JP" b="1" dirty="0" smtClean="0"/>
+              <a:t>4x</a:t>
+            </a:r>
+          </a:p>
+          <a:p>
+            <a:pPr marL="285750" indent="-285750">
+              <a:buFont typeface="Arial" panose="020B0604020202020204" pitchFamily="34" charset="0"/>
+              <a:buChar char="•"/>
+            </a:pPr>
+            <a:r>
+              <a:rPr kumimoji="1" lang="zh-CN" altLang="en-US" dirty="0" smtClean="0"/>
+              <a:t>就是时间复杂度随着</a:t>
+            </a:r>
+            <a:r>
+              <a:rPr kumimoji="1" lang="en-US" altLang="zh-CN" dirty="0" smtClean="0"/>
+              <a:t>input size n</a:t>
+            </a:r>
+            <a:r>
+              <a:rPr kumimoji="1" lang="zh-CN" altLang="en-US" dirty="0" smtClean="0"/>
+              <a:t>的增长而增长，增长率是</a:t>
+            </a:r>
+            <a:r>
+              <a:rPr kumimoji="1" lang="en-US" altLang="zh-CN" smtClean="0"/>
+              <a:t>log n</a:t>
+            </a:r>
+          </a:p>
+          <a:p>
+            <a:pPr marL="285750" indent="-285750">
+              <a:buFont typeface="Arial" panose="020B0604020202020204" pitchFamily="34" charset="0"/>
+              <a:buChar char="•"/>
+            </a:pPr>
+            <a:endParaRPr kumimoji="1" lang="ja-JP" altLang="en-US" dirty="0"/>
+          </a:p>
+        </p:txBody>
+      </p:sp>
     </p:spTree>
     <p:extLst>
       <p:ext uri="{BB962C8B-B14F-4D97-AF65-F5344CB8AC3E}">
@@ -3643,7 +3795,7 @@
   <a:extraClrSchemeLst/>
   <a:extLst>
     <a:ext uri="{05A4C25C-085E-4340-85A3-A5531E510DB2}">
-      <thm15:themeFamily xmlns:thm15="http://schemas.microsoft.com/office/thememl/2012/main" name="Office Theme" id="{62F939B6-93AF-4DB8-9C6B-D6C7DFDC589F}" vid="{4A3C46E8-61CC-4603-A589-7422A47A8E4A}"/>
+      <thm15:themeFamily xmlns:thm15="http://schemas.microsoft.com/office/thememl/2012/main" xmlns="" name="Office Theme" id="{62F939B6-93AF-4DB8-9C6B-D6C7DFDC589F}" vid="{4A3C46E8-61CC-4603-A589-7422A47A8E4A}"/>
     </a:ext>
   </a:extLst>
 </a:theme>

</xml_diff>

<commit_message>
add DFS BFS knowledge 1
</commit_message>
<xml_diff>
--- a/temp.pptx
+++ b/temp.pptx
@@ -106,7 +106,7 @@
   </p:defaultTextStyle>
   <p:extLst>
     <p:ext uri="{EFAFB233-063F-42B5-8137-9DF3F51BA10A}">
-      <p15:sldGuideLst xmlns:p15="http://schemas.microsoft.com/office/powerpoint/2012/main" xmlns="">
+      <p15:sldGuideLst xmlns:p15="http://schemas.microsoft.com/office/powerpoint/2012/main">
         <p15:guide id="1" orient="horz" pos="2160">
           <p15:clr>
             <a:srgbClr val="A4A3A4"/>
@@ -121,10 +121,6 @@
     </p:ext>
   </p:extLst>
 </p:presentation>
-</file>
-
-<file path=ppt/revisionInfo.xml><?xml version="1.0" encoding="utf-8"?>
-<p1510:revInfo xmlns:a="http://schemas.openxmlformats.org/drawingml/2006/main" xmlns:r="http://schemas.openxmlformats.org/officeDocument/2006/relationships" xmlns:p1510="http://schemas.microsoft.com/office/powerpoint/2015/10/main"/>
 </file>
 
 <file path=ppt/slideLayouts/slideLayout1.xml><?xml version="1.0" encoding="utf-8"?>
@@ -149,7 +145,7 @@
           <p:cNvPr id="2" name="Title 1">
             <a:extLst>
               <a:ext uri="{FF2B5EF4-FFF2-40B4-BE49-F238E27FC236}">
-                <a16:creationId xmlns:a16="http://schemas.microsoft.com/office/drawing/2014/main" xmlns="" id="{B5F5F319-D979-4A3F-A4F8-4DDCDE891BFD}"/>
+                <a16:creationId xmlns:a16="http://schemas.microsoft.com/office/drawing/2014/main" id="{B5F5F319-D979-4A3F-A4F8-4DDCDE891BFD}"/>
               </a:ext>
             </a:extLst>
           </p:cNvPr>
@@ -186,7 +182,7 @@
           <p:cNvPr id="3" name="Subtitle 2">
             <a:extLst>
               <a:ext uri="{FF2B5EF4-FFF2-40B4-BE49-F238E27FC236}">
-                <a16:creationId xmlns:a16="http://schemas.microsoft.com/office/drawing/2014/main" xmlns="" id="{4474209B-F46B-471F-B216-60C5F4296C14}"/>
+                <a16:creationId xmlns:a16="http://schemas.microsoft.com/office/drawing/2014/main" id="{4474209B-F46B-471F-B216-60C5F4296C14}"/>
               </a:ext>
             </a:extLst>
           </p:cNvPr>
@@ -256,7 +252,7 @@
           <p:cNvPr id="4" name="Date Placeholder 3">
             <a:extLst>
               <a:ext uri="{FF2B5EF4-FFF2-40B4-BE49-F238E27FC236}">
-                <a16:creationId xmlns:a16="http://schemas.microsoft.com/office/drawing/2014/main" xmlns="" id="{1E6B3389-407A-410F-8F6D-D24D84CA4D6B}"/>
+                <a16:creationId xmlns:a16="http://schemas.microsoft.com/office/drawing/2014/main" id="{1E6B3389-407A-410F-8F6D-D24D84CA4D6B}"/>
               </a:ext>
             </a:extLst>
           </p:cNvPr>
@@ -274,7 +270,7 @@
           <a:p>
             <a:fld id="{E040DD28-DA01-4164-BF9D-AEC6AAD07A3E}" type="datetimeFigureOut">
               <a:rPr lang="en-US" smtClean="0"/>
-              <a:t>1/23/2018</a:t>
+              <a:t>2/20/18</a:t>
             </a:fld>
             <a:endParaRPr lang="en-US"/>
           </a:p>
@@ -285,7 +281,7 @@
           <p:cNvPr id="5" name="Footer Placeholder 4">
             <a:extLst>
               <a:ext uri="{FF2B5EF4-FFF2-40B4-BE49-F238E27FC236}">
-                <a16:creationId xmlns:a16="http://schemas.microsoft.com/office/drawing/2014/main" xmlns="" id="{5D8C0812-771C-43AD-B38F-6BC2255600F9}"/>
+                <a16:creationId xmlns:a16="http://schemas.microsoft.com/office/drawing/2014/main" id="{5D8C0812-771C-43AD-B38F-6BC2255600F9}"/>
               </a:ext>
             </a:extLst>
           </p:cNvPr>
@@ -310,7 +306,7 @@
           <p:cNvPr id="6" name="Slide Number Placeholder 5">
             <a:extLst>
               <a:ext uri="{FF2B5EF4-FFF2-40B4-BE49-F238E27FC236}">
-                <a16:creationId xmlns:a16="http://schemas.microsoft.com/office/drawing/2014/main" xmlns="" id="{F39CB706-EA94-418D-9F2C-336E6EF264EC}"/>
+                <a16:creationId xmlns:a16="http://schemas.microsoft.com/office/drawing/2014/main" id="{F39CB706-EA94-418D-9F2C-336E6EF264EC}"/>
               </a:ext>
             </a:extLst>
           </p:cNvPr>
@@ -369,7 +365,7 @@
           <p:cNvPr id="2" name="Title 1">
             <a:extLst>
               <a:ext uri="{FF2B5EF4-FFF2-40B4-BE49-F238E27FC236}">
-                <a16:creationId xmlns:a16="http://schemas.microsoft.com/office/drawing/2014/main" xmlns="" id="{3A259477-0A53-4114-95B2-8A1D5D83E0A2}"/>
+                <a16:creationId xmlns:a16="http://schemas.microsoft.com/office/drawing/2014/main" id="{3A259477-0A53-4114-95B2-8A1D5D83E0A2}"/>
               </a:ext>
             </a:extLst>
           </p:cNvPr>
@@ -397,7 +393,7 @@
           <p:cNvPr id="3" name="Vertical Text Placeholder 2">
             <a:extLst>
               <a:ext uri="{FF2B5EF4-FFF2-40B4-BE49-F238E27FC236}">
-                <a16:creationId xmlns:a16="http://schemas.microsoft.com/office/drawing/2014/main" xmlns="" id="{533E45B0-73AC-4661-B286-CC8B49D0CBB1}"/>
+                <a16:creationId xmlns:a16="http://schemas.microsoft.com/office/drawing/2014/main" id="{533E45B0-73AC-4661-B286-CC8B49D0CBB1}"/>
               </a:ext>
             </a:extLst>
           </p:cNvPr>
@@ -454,7 +450,7 @@
           <p:cNvPr id="4" name="Date Placeholder 3">
             <a:extLst>
               <a:ext uri="{FF2B5EF4-FFF2-40B4-BE49-F238E27FC236}">
-                <a16:creationId xmlns:a16="http://schemas.microsoft.com/office/drawing/2014/main" xmlns="" id="{DDFFC868-093D-4D95-AA93-2203C226F89B}"/>
+                <a16:creationId xmlns:a16="http://schemas.microsoft.com/office/drawing/2014/main" id="{DDFFC868-093D-4D95-AA93-2203C226F89B}"/>
               </a:ext>
             </a:extLst>
           </p:cNvPr>
@@ -472,7 +468,7 @@
           <a:p>
             <a:fld id="{E040DD28-DA01-4164-BF9D-AEC6AAD07A3E}" type="datetimeFigureOut">
               <a:rPr lang="en-US" smtClean="0"/>
-              <a:t>1/23/2018</a:t>
+              <a:t>2/20/18</a:t>
             </a:fld>
             <a:endParaRPr lang="en-US"/>
           </a:p>
@@ -483,7 +479,7 @@
           <p:cNvPr id="5" name="Footer Placeholder 4">
             <a:extLst>
               <a:ext uri="{FF2B5EF4-FFF2-40B4-BE49-F238E27FC236}">
-                <a16:creationId xmlns:a16="http://schemas.microsoft.com/office/drawing/2014/main" xmlns="" id="{CA068C37-6A3A-44A8-A7BE-58942241414E}"/>
+                <a16:creationId xmlns:a16="http://schemas.microsoft.com/office/drawing/2014/main" id="{CA068C37-6A3A-44A8-A7BE-58942241414E}"/>
               </a:ext>
             </a:extLst>
           </p:cNvPr>
@@ -508,7 +504,7 @@
           <p:cNvPr id="6" name="Slide Number Placeholder 5">
             <a:extLst>
               <a:ext uri="{FF2B5EF4-FFF2-40B4-BE49-F238E27FC236}">
-                <a16:creationId xmlns:a16="http://schemas.microsoft.com/office/drawing/2014/main" xmlns="" id="{E78B41CD-FF00-4C28-A410-5C2081075C8F}"/>
+                <a16:creationId xmlns:a16="http://schemas.microsoft.com/office/drawing/2014/main" id="{E78B41CD-FF00-4C28-A410-5C2081075C8F}"/>
               </a:ext>
             </a:extLst>
           </p:cNvPr>
@@ -567,7 +563,7 @@
           <p:cNvPr id="2" name="Vertical Title 1">
             <a:extLst>
               <a:ext uri="{FF2B5EF4-FFF2-40B4-BE49-F238E27FC236}">
-                <a16:creationId xmlns:a16="http://schemas.microsoft.com/office/drawing/2014/main" xmlns="" id="{09D8892F-E415-4A5B-8DE4-93BDA5F0BB5E}"/>
+                <a16:creationId xmlns:a16="http://schemas.microsoft.com/office/drawing/2014/main" id="{09D8892F-E415-4A5B-8DE4-93BDA5F0BB5E}"/>
               </a:ext>
             </a:extLst>
           </p:cNvPr>
@@ -600,7 +596,7 @@
           <p:cNvPr id="3" name="Vertical Text Placeholder 2">
             <a:extLst>
               <a:ext uri="{FF2B5EF4-FFF2-40B4-BE49-F238E27FC236}">
-                <a16:creationId xmlns:a16="http://schemas.microsoft.com/office/drawing/2014/main" xmlns="" id="{D914CE1D-36B4-41F6-8CAC-A824748DF349}"/>
+                <a16:creationId xmlns:a16="http://schemas.microsoft.com/office/drawing/2014/main" id="{D914CE1D-36B4-41F6-8CAC-A824748DF349}"/>
               </a:ext>
             </a:extLst>
           </p:cNvPr>
@@ -662,7 +658,7 @@
           <p:cNvPr id="4" name="Date Placeholder 3">
             <a:extLst>
               <a:ext uri="{FF2B5EF4-FFF2-40B4-BE49-F238E27FC236}">
-                <a16:creationId xmlns:a16="http://schemas.microsoft.com/office/drawing/2014/main" xmlns="" id="{09EBC416-5C2B-4705-88C6-697C7026E134}"/>
+                <a16:creationId xmlns:a16="http://schemas.microsoft.com/office/drawing/2014/main" id="{09EBC416-5C2B-4705-88C6-697C7026E134}"/>
               </a:ext>
             </a:extLst>
           </p:cNvPr>
@@ -680,7 +676,7 @@
           <a:p>
             <a:fld id="{E040DD28-DA01-4164-BF9D-AEC6AAD07A3E}" type="datetimeFigureOut">
               <a:rPr lang="en-US" smtClean="0"/>
-              <a:t>1/23/2018</a:t>
+              <a:t>2/20/18</a:t>
             </a:fld>
             <a:endParaRPr lang="en-US"/>
           </a:p>
@@ -691,7 +687,7 @@
           <p:cNvPr id="5" name="Footer Placeholder 4">
             <a:extLst>
               <a:ext uri="{FF2B5EF4-FFF2-40B4-BE49-F238E27FC236}">
-                <a16:creationId xmlns:a16="http://schemas.microsoft.com/office/drawing/2014/main" xmlns="" id="{6A181D81-2CCF-4506-BAC8-332F27972DE7}"/>
+                <a16:creationId xmlns:a16="http://schemas.microsoft.com/office/drawing/2014/main" id="{6A181D81-2CCF-4506-BAC8-332F27972DE7}"/>
               </a:ext>
             </a:extLst>
           </p:cNvPr>
@@ -716,7 +712,7 @@
           <p:cNvPr id="6" name="Slide Number Placeholder 5">
             <a:extLst>
               <a:ext uri="{FF2B5EF4-FFF2-40B4-BE49-F238E27FC236}">
-                <a16:creationId xmlns:a16="http://schemas.microsoft.com/office/drawing/2014/main" xmlns="" id="{CF493655-0420-4B38-BA94-CAA81BE6B4A5}"/>
+                <a16:creationId xmlns:a16="http://schemas.microsoft.com/office/drawing/2014/main" id="{CF493655-0420-4B38-BA94-CAA81BE6B4A5}"/>
               </a:ext>
             </a:extLst>
           </p:cNvPr>
@@ -775,7 +771,7 @@
           <p:cNvPr id="2" name="Title 1">
             <a:extLst>
               <a:ext uri="{FF2B5EF4-FFF2-40B4-BE49-F238E27FC236}">
-                <a16:creationId xmlns:a16="http://schemas.microsoft.com/office/drawing/2014/main" xmlns="" id="{93BACEFF-B6D7-4BFD-B93D-95821BFD2D8F}"/>
+                <a16:creationId xmlns:a16="http://schemas.microsoft.com/office/drawing/2014/main" id="{93BACEFF-B6D7-4BFD-B93D-95821BFD2D8F}"/>
               </a:ext>
             </a:extLst>
           </p:cNvPr>
@@ -803,7 +799,7 @@
           <p:cNvPr id="3" name="Content Placeholder 2">
             <a:extLst>
               <a:ext uri="{FF2B5EF4-FFF2-40B4-BE49-F238E27FC236}">
-                <a16:creationId xmlns:a16="http://schemas.microsoft.com/office/drawing/2014/main" xmlns="" id="{59385ED6-5E0D-4E26-B486-3CC0C4291B3B}"/>
+                <a16:creationId xmlns:a16="http://schemas.microsoft.com/office/drawing/2014/main" id="{59385ED6-5E0D-4E26-B486-3CC0C4291B3B}"/>
               </a:ext>
             </a:extLst>
           </p:cNvPr>
@@ -860,7 +856,7 @@
           <p:cNvPr id="4" name="Date Placeholder 3">
             <a:extLst>
               <a:ext uri="{FF2B5EF4-FFF2-40B4-BE49-F238E27FC236}">
-                <a16:creationId xmlns:a16="http://schemas.microsoft.com/office/drawing/2014/main" xmlns="" id="{4FC036BA-799C-484E-9202-7D281BB13E19}"/>
+                <a16:creationId xmlns:a16="http://schemas.microsoft.com/office/drawing/2014/main" id="{4FC036BA-799C-484E-9202-7D281BB13E19}"/>
               </a:ext>
             </a:extLst>
           </p:cNvPr>
@@ -878,7 +874,7 @@
           <a:p>
             <a:fld id="{E040DD28-DA01-4164-BF9D-AEC6AAD07A3E}" type="datetimeFigureOut">
               <a:rPr lang="en-US" smtClean="0"/>
-              <a:t>1/23/2018</a:t>
+              <a:t>2/20/18</a:t>
             </a:fld>
             <a:endParaRPr lang="en-US"/>
           </a:p>
@@ -889,7 +885,7 @@
           <p:cNvPr id="5" name="Footer Placeholder 4">
             <a:extLst>
               <a:ext uri="{FF2B5EF4-FFF2-40B4-BE49-F238E27FC236}">
-                <a16:creationId xmlns:a16="http://schemas.microsoft.com/office/drawing/2014/main" xmlns="" id="{84C705AF-ED38-4DC0-9CAD-82802278E609}"/>
+                <a16:creationId xmlns:a16="http://schemas.microsoft.com/office/drawing/2014/main" id="{84C705AF-ED38-4DC0-9CAD-82802278E609}"/>
               </a:ext>
             </a:extLst>
           </p:cNvPr>
@@ -914,7 +910,7 @@
           <p:cNvPr id="6" name="Slide Number Placeholder 5">
             <a:extLst>
               <a:ext uri="{FF2B5EF4-FFF2-40B4-BE49-F238E27FC236}">
-                <a16:creationId xmlns:a16="http://schemas.microsoft.com/office/drawing/2014/main" xmlns="" id="{FCAB4C5E-BC29-4DA3-8FDD-E88F20A62425}"/>
+                <a16:creationId xmlns:a16="http://schemas.microsoft.com/office/drawing/2014/main" id="{FCAB4C5E-BC29-4DA3-8FDD-E88F20A62425}"/>
               </a:ext>
             </a:extLst>
           </p:cNvPr>
@@ -973,7 +969,7 @@
           <p:cNvPr id="2" name="Title 1">
             <a:extLst>
               <a:ext uri="{FF2B5EF4-FFF2-40B4-BE49-F238E27FC236}">
-                <a16:creationId xmlns:a16="http://schemas.microsoft.com/office/drawing/2014/main" xmlns="" id="{56F4E2A8-3DB4-4F28-996A-ADBBE22EB9E6}"/>
+                <a16:creationId xmlns:a16="http://schemas.microsoft.com/office/drawing/2014/main" id="{56F4E2A8-3DB4-4F28-996A-ADBBE22EB9E6}"/>
               </a:ext>
             </a:extLst>
           </p:cNvPr>
@@ -1010,7 +1006,7 @@
           <p:cNvPr id="3" name="Text Placeholder 2">
             <a:extLst>
               <a:ext uri="{FF2B5EF4-FFF2-40B4-BE49-F238E27FC236}">
-                <a16:creationId xmlns:a16="http://schemas.microsoft.com/office/drawing/2014/main" xmlns="" id="{C89AE634-E835-4FB2-9543-9AE7D101C6F8}"/>
+                <a16:creationId xmlns:a16="http://schemas.microsoft.com/office/drawing/2014/main" id="{C89AE634-E835-4FB2-9543-9AE7D101C6F8}"/>
               </a:ext>
             </a:extLst>
           </p:cNvPr>
@@ -1135,7 +1131,7 @@
           <p:cNvPr id="4" name="Date Placeholder 3">
             <a:extLst>
               <a:ext uri="{FF2B5EF4-FFF2-40B4-BE49-F238E27FC236}">
-                <a16:creationId xmlns:a16="http://schemas.microsoft.com/office/drawing/2014/main" xmlns="" id="{A80E8D62-561D-425F-95E0-D8B490FEAFB0}"/>
+                <a16:creationId xmlns:a16="http://schemas.microsoft.com/office/drawing/2014/main" id="{A80E8D62-561D-425F-95E0-D8B490FEAFB0}"/>
               </a:ext>
             </a:extLst>
           </p:cNvPr>
@@ -1153,7 +1149,7 @@
           <a:p>
             <a:fld id="{E040DD28-DA01-4164-BF9D-AEC6AAD07A3E}" type="datetimeFigureOut">
               <a:rPr lang="en-US" smtClean="0"/>
-              <a:t>1/23/2018</a:t>
+              <a:t>2/20/18</a:t>
             </a:fld>
             <a:endParaRPr lang="en-US"/>
           </a:p>
@@ -1164,7 +1160,7 @@
           <p:cNvPr id="5" name="Footer Placeholder 4">
             <a:extLst>
               <a:ext uri="{FF2B5EF4-FFF2-40B4-BE49-F238E27FC236}">
-                <a16:creationId xmlns:a16="http://schemas.microsoft.com/office/drawing/2014/main" xmlns="" id="{092BFE70-3129-4F21-A151-027B995D8283}"/>
+                <a16:creationId xmlns:a16="http://schemas.microsoft.com/office/drawing/2014/main" id="{092BFE70-3129-4F21-A151-027B995D8283}"/>
               </a:ext>
             </a:extLst>
           </p:cNvPr>
@@ -1189,7 +1185,7 @@
           <p:cNvPr id="6" name="Slide Number Placeholder 5">
             <a:extLst>
               <a:ext uri="{FF2B5EF4-FFF2-40B4-BE49-F238E27FC236}">
-                <a16:creationId xmlns:a16="http://schemas.microsoft.com/office/drawing/2014/main" xmlns="" id="{8021D42E-9379-4CA1-8E67-A8CFC2137736}"/>
+                <a16:creationId xmlns:a16="http://schemas.microsoft.com/office/drawing/2014/main" id="{8021D42E-9379-4CA1-8E67-A8CFC2137736}"/>
               </a:ext>
             </a:extLst>
           </p:cNvPr>
@@ -1248,7 +1244,7 @@
           <p:cNvPr id="2" name="Title 1">
             <a:extLst>
               <a:ext uri="{FF2B5EF4-FFF2-40B4-BE49-F238E27FC236}">
-                <a16:creationId xmlns:a16="http://schemas.microsoft.com/office/drawing/2014/main" xmlns="" id="{6E79E456-1075-4906-82F7-0E6109B9E35D}"/>
+                <a16:creationId xmlns:a16="http://schemas.microsoft.com/office/drawing/2014/main" id="{6E79E456-1075-4906-82F7-0E6109B9E35D}"/>
               </a:ext>
             </a:extLst>
           </p:cNvPr>
@@ -1276,7 +1272,7 @@
           <p:cNvPr id="3" name="Content Placeholder 2">
             <a:extLst>
               <a:ext uri="{FF2B5EF4-FFF2-40B4-BE49-F238E27FC236}">
-                <a16:creationId xmlns:a16="http://schemas.microsoft.com/office/drawing/2014/main" xmlns="" id="{5B119237-D568-4846-9810-EE66DFA84982}"/>
+                <a16:creationId xmlns:a16="http://schemas.microsoft.com/office/drawing/2014/main" id="{5B119237-D568-4846-9810-EE66DFA84982}"/>
               </a:ext>
             </a:extLst>
           </p:cNvPr>
@@ -1338,7 +1334,7 @@
           <p:cNvPr id="4" name="Content Placeholder 3">
             <a:extLst>
               <a:ext uri="{FF2B5EF4-FFF2-40B4-BE49-F238E27FC236}">
-                <a16:creationId xmlns:a16="http://schemas.microsoft.com/office/drawing/2014/main" xmlns="" id="{B4C29F7A-057C-4495-9330-75B170FD1A8C}"/>
+                <a16:creationId xmlns:a16="http://schemas.microsoft.com/office/drawing/2014/main" id="{B4C29F7A-057C-4495-9330-75B170FD1A8C}"/>
               </a:ext>
             </a:extLst>
           </p:cNvPr>
@@ -1400,7 +1396,7 @@
           <p:cNvPr id="5" name="Date Placeholder 4">
             <a:extLst>
               <a:ext uri="{FF2B5EF4-FFF2-40B4-BE49-F238E27FC236}">
-                <a16:creationId xmlns:a16="http://schemas.microsoft.com/office/drawing/2014/main" xmlns="" id="{6B9731BB-E5EB-4386-A8C4-02BCBE618022}"/>
+                <a16:creationId xmlns:a16="http://schemas.microsoft.com/office/drawing/2014/main" id="{6B9731BB-E5EB-4386-A8C4-02BCBE618022}"/>
               </a:ext>
             </a:extLst>
           </p:cNvPr>
@@ -1418,7 +1414,7 @@
           <a:p>
             <a:fld id="{E040DD28-DA01-4164-BF9D-AEC6AAD07A3E}" type="datetimeFigureOut">
               <a:rPr lang="en-US" smtClean="0"/>
-              <a:t>1/23/2018</a:t>
+              <a:t>2/20/18</a:t>
             </a:fld>
             <a:endParaRPr lang="en-US"/>
           </a:p>
@@ -1429,7 +1425,7 @@
           <p:cNvPr id="6" name="Footer Placeholder 5">
             <a:extLst>
               <a:ext uri="{FF2B5EF4-FFF2-40B4-BE49-F238E27FC236}">
-                <a16:creationId xmlns:a16="http://schemas.microsoft.com/office/drawing/2014/main" xmlns="" id="{D61D5281-CDA5-43EF-BE1C-79A1529A08DB}"/>
+                <a16:creationId xmlns:a16="http://schemas.microsoft.com/office/drawing/2014/main" id="{D61D5281-CDA5-43EF-BE1C-79A1529A08DB}"/>
               </a:ext>
             </a:extLst>
           </p:cNvPr>
@@ -1454,7 +1450,7 @@
           <p:cNvPr id="7" name="Slide Number Placeholder 6">
             <a:extLst>
               <a:ext uri="{FF2B5EF4-FFF2-40B4-BE49-F238E27FC236}">
-                <a16:creationId xmlns:a16="http://schemas.microsoft.com/office/drawing/2014/main" xmlns="" id="{39B30A33-21E5-4395-AB23-BAC1B5A92289}"/>
+                <a16:creationId xmlns:a16="http://schemas.microsoft.com/office/drawing/2014/main" id="{39B30A33-21E5-4395-AB23-BAC1B5A92289}"/>
               </a:ext>
             </a:extLst>
           </p:cNvPr>
@@ -1513,7 +1509,7 @@
           <p:cNvPr id="2" name="Title 1">
             <a:extLst>
               <a:ext uri="{FF2B5EF4-FFF2-40B4-BE49-F238E27FC236}">
-                <a16:creationId xmlns:a16="http://schemas.microsoft.com/office/drawing/2014/main" xmlns="" id="{37B4C097-07A2-4984-A86D-7F052CFF4886}"/>
+                <a16:creationId xmlns:a16="http://schemas.microsoft.com/office/drawing/2014/main" id="{37B4C097-07A2-4984-A86D-7F052CFF4886}"/>
               </a:ext>
             </a:extLst>
           </p:cNvPr>
@@ -1546,7 +1542,7 @@
           <p:cNvPr id="3" name="Text Placeholder 2">
             <a:extLst>
               <a:ext uri="{FF2B5EF4-FFF2-40B4-BE49-F238E27FC236}">
-                <a16:creationId xmlns:a16="http://schemas.microsoft.com/office/drawing/2014/main" xmlns="" id="{586C90C0-904E-436B-996B-03DD09FE05C4}"/>
+                <a16:creationId xmlns:a16="http://schemas.microsoft.com/office/drawing/2014/main" id="{586C90C0-904E-436B-996B-03DD09FE05C4}"/>
               </a:ext>
             </a:extLst>
           </p:cNvPr>
@@ -1617,7 +1613,7 @@
           <p:cNvPr id="4" name="Content Placeholder 3">
             <a:extLst>
               <a:ext uri="{FF2B5EF4-FFF2-40B4-BE49-F238E27FC236}">
-                <a16:creationId xmlns:a16="http://schemas.microsoft.com/office/drawing/2014/main" xmlns="" id="{E03CBD82-3AD3-4E06-90BB-01B87FA81FC7}"/>
+                <a16:creationId xmlns:a16="http://schemas.microsoft.com/office/drawing/2014/main" id="{E03CBD82-3AD3-4E06-90BB-01B87FA81FC7}"/>
               </a:ext>
             </a:extLst>
           </p:cNvPr>
@@ -1679,7 +1675,7 @@
           <p:cNvPr id="5" name="Text Placeholder 4">
             <a:extLst>
               <a:ext uri="{FF2B5EF4-FFF2-40B4-BE49-F238E27FC236}">
-                <a16:creationId xmlns:a16="http://schemas.microsoft.com/office/drawing/2014/main" xmlns="" id="{04ACE262-BFED-4131-A5BA-E0278B00A663}"/>
+                <a16:creationId xmlns:a16="http://schemas.microsoft.com/office/drawing/2014/main" id="{04ACE262-BFED-4131-A5BA-E0278B00A663}"/>
               </a:ext>
             </a:extLst>
           </p:cNvPr>
@@ -1750,7 +1746,7 @@
           <p:cNvPr id="6" name="Content Placeholder 5">
             <a:extLst>
               <a:ext uri="{FF2B5EF4-FFF2-40B4-BE49-F238E27FC236}">
-                <a16:creationId xmlns:a16="http://schemas.microsoft.com/office/drawing/2014/main" xmlns="" id="{1BC543A8-1DAB-4F64-93C3-0EB766AE86F9}"/>
+                <a16:creationId xmlns:a16="http://schemas.microsoft.com/office/drawing/2014/main" id="{1BC543A8-1DAB-4F64-93C3-0EB766AE86F9}"/>
               </a:ext>
             </a:extLst>
           </p:cNvPr>
@@ -1812,7 +1808,7 @@
           <p:cNvPr id="7" name="Date Placeholder 6">
             <a:extLst>
               <a:ext uri="{FF2B5EF4-FFF2-40B4-BE49-F238E27FC236}">
-                <a16:creationId xmlns:a16="http://schemas.microsoft.com/office/drawing/2014/main" xmlns="" id="{DBF0794B-2DF7-43D8-8A0C-752A3C841A95}"/>
+                <a16:creationId xmlns:a16="http://schemas.microsoft.com/office/drawing/2014/main" id="{DBF0794B-2DF7-43D8-8A0C-752A3C841A95}"/>
               </a:ext>
             </a:extLst>
           </p:cNvPr>
@@ -1830,7 +1826,7 @@
           <a:p>
             <a:fld id="{E040DD28-DA01-4164-BF9D-AEC6AAD07A3E}" type="datetimeFigureOut">
               <a:rPr lang="en-US" smtClean="0"/>
-              <a:t>1/23/2018</a:t>
+              <a:t>2/20/18</a:t>
             </a:fld>
             <a:endParaRPr lang="en-US"/>
           </a:p>
@@ -1841,7 +1837,7 @@
           <p:cNvPr id="8" name="Footer Placeholder 7">
             <a:extLst>
               <a:ext uri="{FF2B5EF4-FFF2-40B4-BE49-F238E27FC236}">
-                <a16:creationId xmlns:a16="http://schemas.microsoft.com/office/drawing/2014/main" xmlns="" id="{15BFDF4B-45AB-4776-B148-1F4FA0BCD9A6}"/>
+                <a16:creationId xmlns:a16="http://schemas.microsoft.com/office/drawing/2014/main" id="{15BFDF4B-45AB-4776-B148-1F4FA0BCD9A6}"/>
               </a:ext>
             </a:extLst>
           </p:cNvPr>
@@ -1866,7 +1862,7 @@
           <p:cNvPr id="9" name="Slide Number Placeholder 8">
             <a:extLst>
               <a:ext uri="{FF2B5EF4-FFF2-40B4-BE49-F238E27FC236}">
-                <a16:creationId xmlns:a16="http://schemas.microsoft.com/office/drawing/2014/main" xmlns="" id="{74ACFCD8-1AA0-4174-A68D-6293F9717D99}"/>
+                <a16:creationId xmlns:a16="http://schemas.microsoft.com/office/drawing/2014/main" id="{74ACFCD8-1AA0-4174-A68D-6293F9717D99}"/>
               </a:ext>
             </a:extLst>
           </p:cNvPr>
@@ -1925,7 +1921,7 @@
           <p:cNvPr id="2" name="Title 1">
             <a:extLst>
               <a:ext uri="{FF2B5EF4-FFF2-40B4-BE49-F238E27FC236}">
-                <a16:creationId xmlns:a16="http://schemas.microsoft.com/office/drawing/2014/main" xmlns="" id="{A9F3CBAC-2073-439B-B8DE-FB80422902CE}"/>
+                <a16:creationId xmlns:a16="http://schemas.microsoft.com/office/drawing/2014/main" id="{A9F3CBAC-2073-439B-B8DE-FB80422902CE}"/>
               </a:ext>
             </a:extLst>
           </p:cNvPr>
@@ -1953,7 +1949,7 @@
           <p:cNvPr id="3" name="Date Placeholder 2">
             <a:extLst>
               <a:ext uri="{FF2B5EF4-FFF2-40B4-BE49-F238E27FC236}">
-                <a16:creationId xmlns:a16="http://schemas.microsoft.com/office/drawing/2014/main" xmlns="" id="{06A84D4C-CD47-42D3-8505-872676C28963}"/>
+                <a16:creationId xmlns:a16="http://schemas.microsoft.com/office/drawing/2014/main" id="{06A84D4C-CD47-42D3-8505-872676C28963}"/>
               </a:ext>
             </a:extLst>
           </p:cNvPr>
@@ -1971,7 +1967,7 @@
           <a:p>
             <a:fld id="{E040DD28-DA01-4164-BF9D-AEC6AAD07A3E}" type="datetimeFigureOut">
               <a:rPr lang="en-US" smtClean="0"/>
-              <a:t>1/23/2018</a:t>
+              <a:t>2/20/18</a:t>
             </a:fld>
             <a:endParaRPr lang="en-US"/>
           </a:p>
@@ -1982,7 +1978,7 @@
           <p:cNvPr id="4" name="Footer Placeholder 3">
             <a:extLst>
               <a:ext uri="{FF2B5EF4-FFF2-40B4-BE49-F238E27FC236}">
-                <a16:creationId xmlns:a16="http://schemas.microsoft.com/office/drawing/2014/main" xmlns="" id="{B784711A-B8EA-4963-A653-27EE2997119F}"/>
+                <a16:creationId xmlns:a16="http://schemas.microsoft.com/office/drawing/2014/main" id="{B784711A-B8EA-4963-A653-27EE2997119F}"/>
               </a:ext>
             </a:extLst>
           </p:cNvPr>
@@ -2007,7 +2003,7 @@
           <p:cNvPr id="5" name="Slide Number Placeholder 4">
             <a:extLst>
               <a:ext uri="{FF2B5EF4-FFF2-40B4-BE49-F238E27FC236}">
-                <a16:creationId xmlns:a16="http://schemas.microsoft.com/office/drawing/2014/main" xmlns="" id="{9BD0276A-CA50-4B27-9DF4-12C17991F3AD}"/>
+                <a16:creationId xmlns:a16="http://schemas.microsoft.com/office/drawing/2014/main" id="{9BD0276A-CA50-4B27-9DF4-12C17991F3AD}"/>
               </a:ext>
             </a:extLst>
           </p:cNvPr>
@@ -2066,7 +2062,7 @@
           <p:cNvPr id="2" name="Date Placeholder 1">
             <a:extLst>
               <a:ext uri="{FF2B5EF4-FFF2-40B4-BE49-F238E27FC236}">
-                <a16:creationId xmlns:a16="http://schemas.microsoft.com/office/drawing/2014/main" xmlns="" id="{CBE24604-C75B-4F9D-8382-AC380D5DD668}"/>
+                <a16:creationId xmlns:a16="http://schemas.microsoft.com/office/drawing/2014/main" id="{CBE24604-C75B-4F9D-8382-AC380D5DD668}"/>
               </a:ext>
             </a:extLst>
           </p:cNvPr>
@@ -2084,7 +2080,7 @@
           <a:p>
             <a:fld id="{E040DD28-DA01-4164-BF9D-AEC6AAD07A3E}" type="datetimeFigureOut">
               <a:rPr lang="en-US" smtClean="0"/>
-              <a:t>1/23/2018</a:t>
+              <a:t>2/20/18</a:t>
             </a:fld>
             <a:endParaRPr lang="en-US"/>
           </a:p>
@@ -2095,7 +2091,7 @@
           <p:cNvPr id="3" name="Footer Placeholder 2">
             <a:extLst>
               <a:ext uri="{FF2B5EF4-FFF2-40B4-BE49-F238E27FC236}">
-                <a16:creationId xmlns:a16="http://schemas.microsoft.com/office/drawing/2014/main" xmlns="" id="{2641AA10-AE31-466F-96AF-31A1A0955AD1}"/>
+                <a16:creationId xmlns:a16="http://schemas.microsoft.com/office/drawing/2014/main" id="{2641AA10-AE31-466F-96AF-31A1A0955AD1}"/>
               </a:ext>
             </a:extLst>
           </p:cNvPr>
@@ -2120,7 +2116,7 @@
           <p:cNvPr id="4" name="Slide Number Placeholder 3">
             <a:extLst>
               <a:ext uri="{FF2B5EF4-FFF2-40B4-BE49-F238E27FC236}">
-                <a16:creationId xmlns:a16="http://schemas.microsoft.com/office/drawing/2014/main" xmlns="" id="{756609DE-ABCC-4735-9687-532D469DC4E2}"/>
+                <a16:creationId xmlns:a16="http://schemas.microsoft.com/office/drawing/2014/main" id="{756609DE-ABCC-4735-9687-532D469DC4E2}"/>
               </a:ext>
             </a:extLst>
           </p:cNvPr>
@@ -2179,7 +2175,7 @@
           <p:cNvPr id="2" name="Title 1">
             <a:extLst>
               <a:ext uri="{FF2B5EF4-FFF2-40B4-BE49-F238E27FC236}">
-                <a16:creationId xmlns:a16="http://schemas.microsoft.com/office/drawing/2014/main" xmlns="" id="{70B034F0-2116-43B6-A3DF-533AE5CE39CE}"/>
+                <a16:creationId xmlns:a16="http://schemas.microsoft.com/office/drawing/2014/main" id="{70B034F0-2116-43B6-A3DF-533AE5CE39CE}"/>
               </a:ext>
             </a:extLst>
           </p:cNvPr>
@@ -2216,7 +2212,7 @@
           <p:cNvPr id="3" name="Content Placeholder 2">
             <a:extLst>
               <a:ext uri="{FF2B5EF4-FFF2-40B4-BE49-F238E27FC236}">
-                <a16:creationId xmlns:a16="http://schemas.microsoft.com/office/drawing/2014/main" xmlns="" id="{5B8FA73E-8222-4BD6-84B5-93652E6DEF4C}"/>
+                <a16:creationId xmlns:a16="http://schemas.microsoft.com/office/drawing/2014/main" id="{5B8FA73E-8222-4BD6-84B5-93652E6DEF4C}"/>
               </a:ext>
             </a:extLst>
           </p:cNvPr>
@@ -2306,7 +2302,7 @@
           <p:cNvPr id="4" name="Text Placeholder 3">
             <a:extLst>
               <a:ext uri="{FF2B5EF4-FFF2-40B4-BE49-F238E27FC236}">
-                <a16:creationId xmlns:a16="http://schemas.microsoft.com/office/drawing/2014/main" xmlns="" id="{070680AD-0DF4-407C-815A-B6FC0B7A7F1E}"/>
+                <a16:creationId xmlns:a16="http://schemas.microsoft.com/office/drawing/2014/main" id="{070680AD-0DF4-407C-815A-B6FC0B7A7F1E}"/>
               </a:ext>
             </a:extLst>
           </p:cNvPr>
@@ -2377,7 +2373,7 @@
           <p:cNvPr id="5" name="Date Placeholder 4">
             <a:extLst>
               <a:ext uri="{FF2B5EF4-FFF2-40B4-BE49-F238E27FC236}">
-                <a16:creationId xmlns:a16="http://schemas.microsoft.com/office/drawing/2014/main" xmlns="" id="{D828C134-AC88-45CD-8C31-4BAB0E6B3390}"/>
+                <a16:creationId xmlns:a16="http://schemas.microsoft.com/office/drawing/2014/main" id="{D828C134-AC88-45CD-8C31-4BAB0E6B3390}"/>
               </a:ext>
             </a:extLst>
           </p:cNvPr>
@@ -2395,7 +2391,7 @@
           <a:p>
             <a:fld id="{E040DD28-DA01-4164-BF9D-AEC6AAD07A3E}" type="datetimeFigureOut">
               <a:rPr lang="en-US" smtClean="0"/>
-              <a:t>1/23/2018</a:t>
+              <a:t>2/20/18</a:t>
             </a:fld>
             <a:endParaRPr lang="en-US"/>
           </a:p>
@@ -2406,7 +2402,7 @@
           <p:cNvPr id="6" name="Footer Placeholder 5">
             <a:extLst>
               <a:ext uri="{FF2B5EF4-FFF2-40B4-BE49-F238E27FC236}">
-                <a16:creationId xmlns:a16="http://schemas.microsoft.com/office/drawing/2014/main" xmlns="" id="{A6BCAE05-6F4C-44B9-A59A-E9435FAE141A}"/>
+                <a16:creationId xmlns:a16="http://schemas.microsoft.com/office/drawing/2014/main" id="{A6BCAE05-6F4C-44B9-A59A-E9435FAE141A}"/>
               </a:ext>
             </a:extLst>
           </p:cNvPr>
@@ -2431,7 +2427,7 @@
           <p:cNvPr id="7" name="Slide Number Placeholder 6">
             <a:extLst>
               <a:ext uri="{FF2B5EF4-FFF2-40B4-BE49-F238E27FC236}">
-                <a16:creationId xmlns:a16="http://schemas.microsoft.com/office/drawing/2014/main" xmlns="" id="{F3033C98-CC7D-4B89-8DEA-9E1C9B62C714}"/>
+                <a16:creationId xmlns:a16="http://schemas.microsoft.com/office/drawing/2014/main" id="{F3033C98-CC7D-4B89-8DEA-9E1C9B62C714}"/>
               </a:ext>
             </a:extLst>
           </p:cNvPr>
@@ -2490,7 +2486,7 @@
           <p:cNvPr id="2" name="Title 1">
             <a:extLst>
               <a:ext uri="{FF2B5EF4-FFF2-40B4-BE49-F238E27FC236}">
-                <a16:creationId xmlns:a16="http://schemas.microsoft.com/office/drawing/2014/main" xmlns="" id="{C5C61AB1-B345-446E-A14A-919A9FE596A9}"/>
+                <a16:creationId xmlns:a16="http://schemas.microsoft.com/office/drawing/2014/main" id="{C5C61AB1-B345-446E-A14A-919A9FE596A9}"/>
               </a:ext>
             </a:extLst>
           </p:cNvPr>
@@ -2527,7 +2523,7 @@
           <p:cNvPr id="3" name="Picture Placeholder 2">
             <a:extLst>
               <a:ext uri="{FF2B5EF4-FFF2-40B4-BE49-F238E27FC236}">
-                <a16:creationId xmlns:a16="http://schemas.microsoft.com/office/drawing/2014/main" xmlns="" id="{C8FC6971-C8D3-41FA-9E59-9267B41B86D7}"/>
+                <a16:creationId xmlns:a16="http://schemas.microsoft.com/office/drawing/2014/main" id="{C8FC6971-C8D3-41FA-9E59-9267B41B86D7}"/>
               </a:ext>
             </a:extLst>
           </p:cNvPr>
@@ -2594,7 +2590,7 @@
           <p:cNvPr id="4" name="Text Placeholder 3">
             <a:extLst>
               <a:ext uri="{FF2B5EF4-FFF2-40B4-BE49-F238E27FC236}">
-                <a16:creationId xmlns:a16="http://schemas.microsoft.com/office/drawing/2014/main" xmlns="" id="{6D3E27C0-ECF1-4974-89DC-5E5F1753643D}"/>
+                <a16:creationId xmlns:a16="http://schemas.microsoft.com/office/drawing/2014/main" id="{6D3E27C0-ECF1-4974-89DC-5E5F1753643D}"/>
               </a:ext>
             </a:extLst>
           </p:cNvPr>
@@ -2665,7 +2661,7 @@
           <p:cNvPr id="5" name="Date Placeholder 4">
             <a:extLst>
               <a:ext uri="{FF2B5EF4-FFF2-40B4-BE49-F238E27FC236}">
-                <a16:creationId xmlns:a16="http://schemas.microsoft.com/office/drawing/2014/main" xmlns="" id="{EB0CF908-7B88-457C-A7CB-BA8E59EFE6B1}"/>
+                <a16:creationId xmlns:a16="http://schemas.microsoft.com/office/drawing/2014/main" id="{EB0CF908-7B88-457C-A7CB-BA8E59EFE6B1}"/>
               </a:ext>
             </a:extLst>
           </p:cNvPr>
@@ -2683,7 +2679,7 @@
           <a:p>
             <a:fld id="{E040DD28-DA01-4164-BF9D-AEC6AAD07A3E}" type="datetimeFigureOut">
               <a:rPr lang="en-US" smtClean="0"/>
-              <a:t>1/23/2018</a:t>
+              <a:t>2/20/18</a:t>
             </a:fld>
             <a:endParaRPr lang="en-US"/>
           </a:p>
@@ -2694,7 +2690,7 @@
           <p:cNvPr id="6" name="Footer Placeholder 5">
             <a:extLst>
               <a:ext uri="{FF2B5EF4-FFF2-40B4-BE49-F238E27FC236}">
-                <a16:creationId xmlns:a16="http://schemas.microsoft.com/office/drawing/2014/main" xmlns="" id="{9EFEFD02-5829-4D99-8387-FA6DDA7FDCE6}"/>
+                <a16:creationId xmlns:a16="http://schemas.microsoft.com/office/drawing/2014/main" id="{9EFEFD02-5829-4D99-8387-FA6DDA7FDCE6}"/>
               </a:ext>
             </a:extLst>
           </p:cNvPr>
@@ -2719,7 +2715,7 @@
           <p:cNvPr id="7" name="Slide Number Placeholder 6">
             <a:extLst>
               <a:ext uri="{FF2B5EF4-FFF2-40B4-BE49-F238E27FC236}">
-                <a16:creationId xmlns:a16="http://schemas.microsoft.com/office/drawing/2014/main" xmlns="" id="{CC83D447-B6BD-4EB6-84FA-277F982BD485}"/>
+                <a16:creationId xmlns:a16="http://schemas.microsoft.com/office/drawing/2014/main" id="{CC83D447-B6BD-4EB6-84FA-277F982BD485}"/>
               </a:ext>
             </a:extLst>
           </p:cNvPr>
@@ -2783,7 +2779,7 @@
           <p:cNvPr id="2" name="Title Placeholder 1">
             <a:extLst>
               <a:ext uri="{FF2B5EF4-FFF2-40B4-BE49-F238E27FC236}">
-                <a16:creationId xmlns:a16="http://schemas.microsoft.com/office/drawing/2014/main" xmlns="" id="{BF4BEE1F-B564-43B7-B55B-42176FDCF6A5}"/>
+                <a16:creationId xmlns:a16="http://schemas.microsoft.com/office/drawing/2014/main" id="{BF4BEE1F-B564-43B7-B55B-42176FDCF6A5}"/>
               </a:ext>
             </a:extLst>
           </p:cNvPr>
@@ -2821,7 +2817,7 @@
           <p:cNvPr id="3" name="Text Placeholder 2">
             <a:extLst>
               <a:ext uri="{FF2B5EF4-FFF2-40B4-BE49-F238E27FC236}">
-                <a16:creationId xmlns:a16="http://schemas.microsoft.com/office/drawing/2014/main" xmlns="" id="{C280B79D-E421-4AC8-A9C2-4B56DA344FB6}"/>
+                <a16:creationId xmlns:a16="http://schemas.microsoft.com/office/drawing/2014/main" id="{C280B79D-E421-4AC8-A9C2-4B56DA344FB6}"/>
               </a:ext>
             </a:extLst>
           </p:cNvPr>
@@ -2888,7 +2884,7 @@
           <p:cNvPr id="4" name="Date Placeholder 3">
             <a:extLst>
               <a:ext uri="{FF2B5EF4-FFF2-40B4-BE49-F238E27FC236}">
-                <a16:creationId xmlns:a16="http://schemas.microsoft.com/office/drawing/2014/main" xmlns="" id="{5805F7AC-3768-4B7D-A30D-D8CB381EF3DC}"/>
+                <a16:creationId xmlns:a16="http://schemas.microsoft.com/office/drawing/2014/main" id="{5805F7AC-3768-4B7D-A30D-D8CB381EF3DC}"/>
               </a:ext>
             </a:extLst>
           </p:cNvPr>
@@ -2924,7 +2920,7 @@
           <a:p>
             <a:fld id="{E040DD28-DA01-4164-BF9D-AEC6AAD07A3E}" type="datetimeFigureOut">
               <a:rPr lang="en-US" smtClean="0"/>
-              <a:t>1/23/2018</a:t>
+              <a:t>2/20/18</a:t>
             </a:fld>
             <a:endParaRPr lang="en-US"/>
           </a:p>
@@ -2935,7 +2931,7 @@
           <p:cNvPr id="5" name="Footer Placeholder 4">
             <a:extLst>
               <a:ext uri="{FF2B5EF4-FFF2-40B4-BE49-F238E27FC236}">
-                <a16:creationId xmlns:a16="http://schemas.microsoft.com/office/drawing/2014/main" xmlns="" id="{1F22F8AA-82E2-4EE1-A481-8556E12EA635}"/>
+                <a16:creationId xmlns:a16="http://schemas.microsoft.com/office/drawing/2014/main" id="{1F22F8AA-82E2-4EE1-A481-8556E12EA635}"/>
               </a:ext>
             </a:extLst>
           </p:cNvPr>
@@ -2978,7 +2974,7 @@
           <p:cNvPr id="6" name="Slide Number Placeholder 5">
             <a:extLst>
               <a:ext uri="{FF2B5EF4-FFF2-40B4-BE49-F238E27FC236}">
-                <a16:creationId xmlns:a16="http://schemas.microsoft.com/office/drawing/2014/main" xmlns="" id="{AEDE27F2-C1D2-4B19-8C04-6B34AC016DA7}"/>
+                <a16:creationId xmlns:a16="http://schemas.microsoft.com/office/drawing/2014/main" id="{AEDE27F2-C1D2-4B19-8C04-6B34AC016DA7}"/>
               </a:ext>
             </a:extLst>
           </p:cNvPr>
@@ -3364,11 +3360,11 @@
           <a:lstStyle/>
           <a:p>
             <a:r>
-              <a:rPr kumimoji="1" lang="en-US" altLang="ja-JP" dirty="0" smtClean="0"/>
+              <a:rPr kumimoji="1" lang="en-US" altLang="ja-JP" dirty="0"/>
               <a:t>What is means by having </a:t>
             </a:r>
             <a:r>
-              <a:rPr kumimoji="1" lang="en-US" altLang="ja-JP" b="1" dirty="0" smtClean="0">
+              <a:rPr kumimoji="1" lang="en-US" altLang="ja-JP" b="1" dirty="0">
                 <a:solidFill>
                   <a:srgbClr val="FF0000"/>
                 </a:solidFill>
@@ -3376,7 +3372,7 @@
               <a:t>O(</a:t>
             </a:r>
             <a:r>
-              <a:rPr kumimoji="1" lang="en-US" altLang="ja-JP" b="1" dirty="0" err="1" smtClean="0">
+              <a:rPr kumimoji="1" lang="en-US" altLang="ja-JP" b="1" dirty="0" err="1">
                 <a:solidFill>
                   <a:srgbClr val="FF0000"/>
                 </a:solidFill>
@@ -3384,7 +3380,7 @@
               <a:t>logn</a:t>
             </a:r>
             <a:r>
-              <a:rPr kumimoji="1" lang="en-US" altLang="ja-JP" b="1" dirty="0" smtClean="0">
+              <a:rPr kumimoji="1" lang="en-US" altLang="ja-JP" b="1" dirty="0">
                 <a:solidFill>
                   <a:srgbClr val="FF0000"/>
                 </a:solidFill>
@@ -3392,7 +3388,7 @@
               <a:t>)</a:t>
             </a:r>
             <a:r>
-              <a:rPr kumimoji="1" lang="en-US" altLang="ja-JP" dirty="0" smtClean="0"/>
+              <a:rPr kumimoji="1" lang="en-US" altLang="ja-JP" dirty="0"/>
               <a:t> time complexity?</a:t>
             </a:r>
           </a:p>
@@ -3403,15 +3399,7 @@
             </a:pPr>
             <a:r>
               <a:rPr lang="en-US" altLang="ja-JP" dirty="0"/>
-              <a:t>(</a:t>
-            </a:r>
-            <a:r>
-              <a:rPr lang="en-US" altLang="ja-JP" dirty="0"/>
-              <a:t>O(log n)</a:t>
-            </a:r>
-            <a:r>
-              <a:rPr lang="en-US" altLang="ja-JP" dirty="0"/>
-              <a:t>) essentially means that the running time grows in proportion to the </a:t>
+              <a:t>(O(log n)) essentially means that the running time grows in proportion to the </a:t>
             </a:r>
             <a:r>
               <a:rPr lang="en-US" altLang="ja-JP" i="1" dirty="0"/>
@@ -3419,11 +3407,19 @@
             </a:r>
             <a:r>
               <a:rPr lang="en-US" altLang="ja-JP" dirty="0"/>
-              <a:t> of the input size - as an example, if 10 items takes at most some amount of time </a:t>
+              <a:t> of the input size - as an example, if 10 items takes at most some amount of time x, and </a:t>
+            </a:r>
+            <a:r>
+              <a:rPr lang="en-US" altLang="ja-JP" b="1" dirty="0"/>
+              <a:t>100</a:t>
             </a:r>
             <a:r>
               <a:rPr lang="en-US" altLang="ja-JP" dirty="0"/>
-              <a:t>x</a:t>
+              <a:t> items takes at most, say, </a:t>
+            </a:r>
+            <a:r>
+              <a:rPr lang="en-US" altLang="ja-JP" b="1" dirty="0"/>
+              <a:t>2x</a:t>
             </a:r>
             <a:r>
               <a:rPr lang="en-US" altLang="ja-JP" dirty="0"/>
@@ -3431,34 +3427,14 @@
             </a:r>
             <a:r>
               <a:rPr lang="en-US" altLang="ja-JP" b="1" dirty="0"/>
-              <a:t>100</a:t>
+              <a:t>10,000 </a:t>
             </a:r>
             <a:r>
               <a:rPr lang="en-US" altLang="ja-JP" dirty="0"/>
-              <a:t> items takes at most, say, </a:t>
+              <a:t>items takes at most </a:t>
             </a:r>
             <a:r>
               <a:rPr lang="en-US" altLang="ja-JP" b="1" dirty="0"/>
-              <a:t>2x</a:t>
-            </a:r>
-            <a:r>
-              <a:rPr lang="en-US" altLang="ja-JP" dirty="0"/>
-              <a:t>, and </a:t>
-            </a:r>
-            <a:r>
-              <a:rPr lang="en-US" altLang="ja-JP" b="1" dirty="0" smtClean="0"/>
-              <a:t>10,000 </a:t>
-            </a:r>
-            <a:r>
-              <a:rPr lang="en-US" altLang="ja-JP" dirty="0" smtClean="0"/>
-              <a:t>items </a:t>
-            </a:r>
-            <a:r>
-              <a:rPr lang="en-US" altLang="ja-JP" dirty="0"/>
-              <a:t>takes at most </a:t>
-            </a:r>
-            <a:r>
-              <a:rPr lang="en-US" altLang="ja-JP" b="1" dirty="0" smtClean="0"/>
               <a:t>4x</a:t>
             </a:r>
           </a:p>
@@ -3468,19 +3444,19 @@
               <a:buChar char="•"/>
             </a:pPr>
             <a:r>
-              <a:rPr kumimoji="1" lang="zh-CN" altLang="en-US" dirty="0" smtClean="0"/>
+              <a:rPr kumimoji="1" lang="zh-CN" altLang="en-US" dirty="0"/>
               <a:t>就是时间复杂度随着</a:t>
             </a:r>
             <a:r>
-              <a:rPr kumimoji="1" lang="en-US" altLang="zh-CN" dirty="0" smtClean="0"/>
+              <a:rPr kumimoji="1" lang="en-US" altLang="zh-CN" dirty="0"/>
               <a:t>input size n</a:t>
             </a:r>
             <a:r>
-              <a:rPr kumimoji="1" lang="zh-CN" altLang="en-US" dirty="0" smtClean="0"/>
+              <a:rPr kumimoji="1" lang="zh-CN" altLang="en-US" dirty="0"/>
               <a:t>的增长而增长，增长率是</a:t>
             </a:r>
             <a:r>
-              <a:rPr kumimoji="1" lang="en-US" altLang="zh-CN" smtClean="0"/>
+              <a:rPr kumimoji="1" lang="en-US" altLang="zh-CN"/>
               <a:t>log n</a:t>
             </a:r>
           </a:p>
@@ -3490,6 +3466,297 @@
               <a:buChar char="•"/>
             </a:pPr>
             <a:endParaRPr kumimoji="1" lang="ja-JP" altLang="en-US" dirty="0"/>
+          </a:p>
+        </p:txBody>
+      </p:sp>
+      <p:sp>
+        <p:nvSpPr>
+          <p:cNvPr id="3" name="テキスト ボックス 3">
+            <a:extLst>
+              <a:ext uri="{FF2B5EF4-FFF2-40B4-BE49-F238E27FC236}">
+                <a16:creationId xmlns:a16="http://schemas.microsoft.com/office/drawing/2014/main" id="{2CEB2075-D44C-1442-B073-9B8CCD3B9C39}"/>
+              </a:ext>
+            </a:extLst>
+          </p:cNvPr>
+          <p:cNvSpPr txBox="1"/>
+          <p:nvPr/>
+        </p:nvSpPr>
+        <p:spPr>
+          <a:xfrm>
+            <a:off x="1186544" y="4140874"/>
+            <a:ext cx="7135287" cy="2292935"/>
+          </a:xfrm>
+          <a:prstGeom prst="rect">
+            <a:avLst/>
+          </a:prstGeom>
+          <a:noFill/>
+        </p:spPr>
+        <p:txBody>
+          <a:bodyPr wrap="none" rtlCol="0">
+            <a:spAutoFit/>
+          </a:bodyPr>
+          <a:lstStyle/>
+          <a:p>
+            <a:r>
+              <a:rPr kumimoji="1" lang="en-US" altLang="ja-JP" sz="1100" b="1" dirty="0">
+                <a:solidFill>
+                  <a:srgbClr val="FF0000"/>
+                </a:solidFill>
+              </a:rPr>
+              <a:t>DFS</a:t>
+            </a:r>
+            <a:r>
+              <a:rPr kumimoji="1" lang="en-US" altLang="ja-JP" sz="1100" dirty="0"/>
+              <a:t>: </a:t>
+            </a:r>
+            <a:r>
+              <a:rPr kumimoji="1" lang="zh-CN" altLang="en-US" sz="1100" dirty="0"/>
+              <a:t>因为看到新的</a:t>
+            </a:r>
+            <a:r>
+              <a:rPr kumimoji="1" lang="en-US" altLang="zh-CN" sz="1100" dirty="0"/>
+              <a:t>child</a:t>
+            </a:r>
+            <a:r>
+              <a:rPr kumimoji="1" lang="zh-CN" altLang="en-US" sz="1100" dirty="0"/>
+              <a:t>就</a:t>
+            </a:r>
+            <a:r>
+              <a:rPr kumimoji="1" lang="en-US" altLang="zh-CN" sz="1100" dirty="0"/>
+              <a:t>push</a:t>
+            </a:r>
+            <a:r>
+              <a:rPr kumimoji="1" lang="zh-CN" altLang="en-US" sz="1100" dirty="0"/>
+              <a:t>到</a:t>
+            </a:r>
+            <a:r>
+              <a:rPr kumimoji="1" lang="en-US" altLang="zh-CN" sz="1100" dirty="0"/>
+              <a:t>stack</a:t>
+            </a:r>
+            <a:r>
+              <a:rPr kumimoji="1" lang="zh-CN" altLang="en-US" sz="1100" dirty="0"/>
+              <a:t>里，所以会往深处走</a:t>
+            </a:r>
+            <a:endParaRPr kumimoji="1" lang="en-US" altLang="ja-JP" sz="1100" dirty="0"/>
+          </a:p>
+          <a:p>
+            <a:pPr marL="342900" indent="-342900">
+              <a:buFont typeface="+mj-lt"/>
+              <a:buAutoNum type="arabicPeriod"/>
+            </a:pPr>
+            <a:r>
+              <a:rPr lang="en-US" altLang="ja-JP" sz="1100" dirty="0"/>
+              <a:t>Push root to </a:t>
+            </a:r>
+            <a:r>
+              <a:rPr lang="en-US" altLang="ja-JP" sz="1100" b="1" u="sng" dirty="0"/>
+              <a:t>stack</a:t>
+            </a:r>
+          </a:p>
+          <a:p>
+            <a:pPr marL="342900" indent="-342900">
+              <a:buFont typeface="+mj-lt"/>
+              <a:buAutoNum type="arabicPeriod"/>
+            </a:pPr>
+            <a:r>
+              <a:rPr kumimoji="1" lang="en-US" altLang="ja-JP" sz="1100" dirty="0"/>
+              <a:t>Loop until stack empty</a:t>
+            </a:r>
+          </a:p>
+          <a:p>
+            <a:pPr marL="342900" indent="-342900">
+              <a:buFont typeface="+mj-lt"/>
+              <a:buAutoNum type="arabicPeriod"/>
+            </a:pPr>
+            <a:r>
+              <a:rPr lang="en-US" altLang="ja-JP" sz="1100" dirty="0"/>
+              <a:t>Peek the node in stack</a:t>
+            </a:r>
+          </a:p>
+          <a:p>
+            <a:pPr marL="342900" indent="-342900">
+              <a:buFont typeface="+mj-lt"/>
+              <a:buAutoNum type="arabicPeriod"/>
+            </a:pPr>
+            <a:r>
+              <a:rPr kumimoji="1" lang="en-US" altLang="ja-JP" sz="1100" dirty="0"/>
+              <a:t>If this node has unvisited a child, get this child, mark </a:t>
+            </a:r>
+            <a:r>
+              <a:rPr kumimoji="1" lang="en-US" altLang="ja-JP" sz="1100" b="1" u="sng" dirty="0"/>
+              <a:t>it</a:t>
+            </a:r>
+            <a:r>
+              <a:rPr kumimoji="1" lang="en-US" altLang="ja-JP" sz="1100" dirty="0"/>
+              <a:t> as visited and push it to stack (</a:t>
+            </a:r>
+            <a:r>
+              <a:rPr kumimoji="1" lang="zh-CN" altLang="en-US" sz="1100" dirty="0"/>
+              <a:t>这个</a:t>
+            </a:r>
+            <a:r>
+              <a:rPr kumimoji="1" lang="en-US" altLang="zh-CN" sz="1100" dirty="0"/>
+              <a:t>child</a:t>
+            </a:r>
+            <a:r>
+              <a:rPr kumimoji="1" lang="zh-CN" altLang="en-US" sz="1100" dirty="0"/>
+              <a:t>现在在</a:t>
+            </a:r>
+            <a:r>
+              <a:rPr kumimoji="1" lang="en-US" altLang="zh-CN" sz="1100" dirty="0"/>
+              <a:t>stack</a:t>
+            </a:r>
+            <a:r>
+              <a:rPr kumimoji="1" lang="zh-CN" altLang="en-US" sz="1100" dirty="0"/>
+              <a:t>最上面</a:t>
+            </a:r>
+            <a:r>
+              <a:rPr kumimoji="1" lang="en-US" altLang="ja-JP" sz="1100" dirty="0"/>
+              <a:t>)</a:t>
+            </a:r>
+          </a:p>
+          <a:p>
+            <a:pPr marL="800100" lvl="1" indent="-342900">
+              <a:buFont typeface="Arial" panose="020B0604020202020204" pitchFamily="34" charset="0"/>
+              <a:buChar char="•"/>
+            </a:pPr>
+            <a:r>
+              <a:rPr lang="zh-CN" altLang="en-US" sz="1100" dirty="0"/>
+              <a:t>注意，看到一个</a:t>
+            </a:r>
+            <a:r>
+              <a:rPr lang="en-US" altLang="zh-CN" sz="1100" dirty="0"/>
+              <a:t>unvisited child</a:t>
+            </a:r>
+            <a:r>
+              <a:rPr lang="zh-CN" altLang="en-US" sz="1100" dirty="0"/>
+              <a:t>就直接</a:t>
+            </a:r>
+            <a:r>
+              <a:rPr lang="en-US" altLang="zh-CN" sz="1100" dirty="0"/>
+              <a:t>push</a:t>
+            </a:r>
+            <a:r>
+              <a:rPr lang="zh-CN" altLang="en-US" sz="1100" dirty="0"/>
+              <a:t>， 先不管其他的</a:t>
+            </a:r>
+            <a:r>
+              <a:rPr lang="en-US" altLang="zh-CN" sz="1100" dirty="0"/>
+              <a:t>unvisited child</a:t>
+            </a:r>
+            <a:endParaRPr kumimoji="1" lang="en-US" altLang="ja-JP" sz="1100" dirty="0"/>
+          </a:p>
+          <a:p>
+            <a:pPr marL="342900" indent="-342900">
+              <a:buFont typeface="+mj-lt"/>
+              <a:buAutoNum type="arabicPeriod"/>
+            </a:pPr>
+            <a:r>
+              <a:rPr kumimoji="1" lang="en-US" altLang="ja-JP" sz="1100" dirty="0"/>
+              <a:t>If this node does NOT have unvisited child, pop it out.</a:t>
+            </a:r>
+            <a:endParaRPr kumimoji="1" lang="en-US" altLang="ja-JP" sz="1100" b="1" dirty="0">
+              <a:solidFill>
+                <a:srgbClr val="FF0000"/>
+              </a:solidFill>
+            </a:endParaRPr>
+          </a:p>
+          <a:p>
+            <a:r>
+              <a:rPr kumimoji="1" lang="en-US" altLang="zh-CN" sz="1100" b="1" dirty="0">
+                <a:solidFill>
+                  <a:srgbClr val="FF0000"/>
+                </a:solidFill>
+              </a:rPr>
+              <a:t>BFS</a:t>
+            </a:r>
+            <a:r>
+              <a:rPr kumimoji="1" lang="en-US" altLang="zh-CN" sz="1100" dirty="0"/>
+              <a:t>: </a:t>
+            </a:r>
+          </a:p>
+          <a:p>
+            <a:pPr marL="342900" indent="-342900">
+              <a:buFont typeface="+mj-lt"/>
+              <a:buAutoNum type="arabicPeriod"/>
+            </a:pPr>
+            <a:r>
+              <a:rPr kumimoji="1" lang="en-US" altLang="zh-CN" sz="1100" dirty="0"/>
+              <a:t>Push root to </a:t>
+            </a:r>
+            <a:r>
+              <a:rPr kumimoji="1" lang="en-US" altLang="zh-CN" sz="1100" b="1" u="sng" dirty="0"/>
+              <a:t>queue</a:t>
+            </a:r>
+          </a:p>
+          <a:p>
+            <a:pPr marL="342900" indent="-342900">
+              <a:buFont typeface="+mj-lt"/>
+              <a:buAutoNum type="arabicPeriod"/>
+            </a:pPr>
+            <a:r>
+              <a:rPr lang="en-US" altLang="ja-JP" sz="1100" dirty="0"/>
+              <a:t>Loop until queue empty</a:t>
+            </a:r>
+          </a:p>
+          <a:p>
+            <a:pPr marL="342900" indent="-342900">
+              <a:buFont typeface="+mj-lt"/>
+              <a:buAutoNum type="arabicPeriod"/>
+            </a:pPr>
+            <a:r>
+              <a:rPr kumimoji="1" lang="en-US" altLang="ja-JP" sz="1100" dirty="0"/>
+              <a:t>Remove a node in queue</a:t>
+            </a:r>
+          </a:p>
+          <a:p>
+            <a:pPr marL="342900" indent="-342900">
+              <a:buFont typeface="+mj-lt"/>
+              <a:buAutoNum type="arabicPeriod"/>
+            </a:pPr>
+            <a:r>
+              <a:rPr lang="en-US" altLang="ja-JP" sz="1100" dirty="0"/>
+              <a:t>If this node has unvisited child, mark </a:t>
+            </a:r>
+            <a:r>
+              <a:rPr lang="en-US" altLang="ja-JP" sz="1100" b="1" u="sng" dirty="0"/>
+              <a:t>them</a:t>
+            </a:r>
+            <a:r>
+              <a:rPr lang="en-US" altLang="ja-JP" sz="1100" dirty="0"/>
+              <a:t> as visited and push it to queue ()</a:t>
+            </a:r>
+          </a:p>
+          <a:p>
+            <a:pPr marL="800100" lvl="1" indent="-342900">
+              <a:buFont typeface="Arial" panose="020B0604020202020204" pitchFamily="34" charset="0"/>
+              <a:buChar char="•"/>
+            </a:pPr>
+            <a:r>
+              <a:rPr kumimoji="1" lang="zh-CN" altLang="en-US" sz="1100" dirty="0"/>
+              <a:t>注意，这一步要把所有</a:t>
+            </a:r>
+            <a:r>
+              <a:rPr kumimoji="1" lang="en-US" altLang="zh-CN" sz="1100" dirty="0"/>
+              <a:t>unvisited child</a:t>
+            </a:r>
+            <a:r>
+              <a:rPr kumimoji="1" lang="zh-CN" altLang="en-US" sz="1100" dirty="0"/>
+              <a:t>都</a:t>
+            </a:r>
+            <a:r>
+              <a:rPr kumimoji="1" lang="en-US" altLang="zh-CN" sz="1100" dirty="0"/>
+              <a:t>push</a:t>
+            </a:r>
+            <a:r>
+              <a:rPr kumimoji="1" lang="zh-CN" altLang="en-US" sz="1100" dirty="0"/>
+              <a:t>进</a:t>
+            </a:r>
+            <a:r>
+              <a:rPr kumimoji="1" lang="en-US" altLang="zh-CN" sz="1100" dirty="0"/>
+              <a:t>queue</a:t>
+            </a:r>
+            <a:endParaRPr kumimoji="1" lang="ja-JP" altLang="en-US" sz="1100" dirty="0"/>
           </a:p>
         </p:txBody>
       </p:sp>
@@ -3795,7 +4062,7 @@
   <a:extraClrSchemeLst/>
   <a:extLst>
     <a:ext uri="{05A4C25C-085E-4340-85A3-A5531E510DB2}">
-      <thm15:themeFamily xmlns:thm15="http://schemas.microsoft.com/office/thememl/2012/main" xmlns="" name="Office Theme" id="{62F939B6-93AF-4DB8-9C6B-D6C7DFDC589F}" vid="{4A3C46E8-61CC-4603-A589-7422A47A8E4A}"/>
+      <thm15:themeFamily xmlns:thm15="http://schemas.microsoft.com/office/thememl/2012/main" name="Office Theme" id="{62F939B6-93AF-4DB8-9C6B-D6C7DFDC589F}" vid="{4A3C46E8-61CC-4603-A589-7422A47A8E4A}"/>
     </a:ext>
   </a:extLst>
 </a:theme>

</xml_diff>